<commit_message>
Added search term link (lmgtfy) to resources page
</commit_message>
<xml_diff>
--- a/Compost Presentation.pptx
+++ b/Compost Presentation.pptx
@@ -5,7 +5,7 @@
     <p:sldMasterId id="2147483792" r:id="rId1"/>
   </p:sldMasterIdLst>
   <p:notesMasterIdLst>
-    <p:notesMasterId r:id="rId19"/>
+    <p:notesMasterId r:id="rId18"/>
   </p:notesMasterIdLst>
   <p:sldIdLst>
     <p:sldId id="279" r:id="rId2"/>
@@ -24,10 +24,9 @@
     <p:sldId id="272" r:id="rId15"/>
     <p:sldId id="269" r:id="rId16"/>
     <p:sldId id="278" r:id="rId17"/>
-    <p:sldId id="271" r:id="rId18"/>
   </p:sldIdLst>
   <p:sldSz cx="9144000" cy="6858000" type="screen4x3"/>
-  <p:notesSz cx="9144000" cy="6858000"/>
+  <p:notesSz cx="6858000" cy="9144000"/>
   <p:defaultTextStyle>
     <a:defPPr>
       <a:defRPr lang="en-US"/>
@@ -161,7 +160,7 @@
         <p:spPr>
           <a:xfrm>
             <a:off x="0" y="0"/>
-            <a:ext cx="3962400" cy="342900"/>
+            <a:ext cx="2971800" cy="457200"/>
           </a:xfrm>
           <a:prstGeom prst="rect">
             <a:avLst/>
@@ -191,8 +190,8 @@
         </p:nvSpPr>
         <p:spPr>
           <a:xfrm>
-            <a:off x="5179484" y="0"/>
-            <a:ext cx="3962400" cy="342900"/>
+            <a:off x="3884613" y="0"/>
+            <a:ext cx="2971800" cy="457200"/>
           </a:xfrm>
           <a:prstGeom prst="rect">
             <a:avLst/>
@@ -226,8 +225,8 @@
         </p:nvSpPr>
         <p:spPr>
           <a:xfrm>
-            <a:off x="2857500" y="514350"/>
-            <a:ext cx="3429000" cy="2571750"/>
+            <a:off x="1143000" y="685800"/>
+            <a:ext cx="4572000" cy="3429000"/>
           </a:xfrm>
           <a:prstGeom prst="rect">
             <a:avLst/>
@@ -259,8 +258,8 @@
         </p:nvSpPr>
         <p:spPr>
           <a:xfrm>
-            <a:off x="914400" y="3257550"/>
-            <a:ext cx="7315200" cy="3086100"/>
+            <a:off x="685800" y="4343400"/>
+            <a:ext cx="5486400" cy="4114800"/>
           </a:xfrm>
           <a:prstGeom prst="rect">
             <a:avLst/>
@@ -319,8 +318,8 @@
         </p:nvSpPr>
         <p:spPr>
           <a:xfrm>
-            <a:off x="0" y="6513910"/>
-            <a:ext cx="3962400" cy="342900"/>
+            <a:off x="0" y="8685213"/>
+            <a:ext cx="2971800" cy="457200"/>
           </a:xfrm>
           <a:prstGeom prst="rect">
             <a:avLst/>
@@ -350,8 +349,8 @@
         </p:nvSpPr>
         <p:spPr>
           <a:xfrm>
-            <a:off x="5179484" y="6513910"/>
-            <a:ext cx="3962400" cy="342900"/>
+            <a:off x="3884613" y="8685213"/>
+            <a:ext cx="2971800" cy="457200"/>
           </a:xfrm>
           <a:prstGeom prst="rect">
             <a:avLst/>
@@ -1414,21 +1413,84 @@
           <a:bodyPr/>
           <a:lstStyle/>
           <a:p>
+            <a:pPr marL="171450" indent="-171450">
+              <a:buFont typeface="Arial" panose="020B0604020202020204" pitchFamily="34" charset="0"/>
+              <a:buChar char="•"/>
+            </a:pPr>
+            <a:r>
+              <a:rPr lang="en-US" dirty="0" smtClean="0"/>
+              <a:t>Check out the Joe Gardener website for his free PDF on composting at home</a:t>
+            </a:r>
+          </a:p>
+          <a:p>
+            <a:pPr marL="171450" indent="-171450">
+              <a:buFont typeface="Arial" panose="020B0604020202020204" pitchFamily="34" charset="0"/>
+              <a:buChar char="•"/>
+            </a:pPr>
+            <a:r>
+              <a:rPr lang="en-US" dirty="0" smtClean="0"/>
+              <a:t>Also,</a:t>
+            </a:r>
+            <a:r>
+              <a:rPr lang="en-US" baseline="0" dirty="0" smtClean="0"/>
+              <a:t> periodically check my </a:t>
+            </a:r>
+            <a:r>
+              <a:rPr lang="en-US" baseline="0" dirty="0" err="1" smtClean="0"/>
+              <a:t>Github</a:t>
+            </a:r>
+            <a:r>
+              <a:rPr lang="en-US" baseline="0" dirty="0" smtClean="0"/>
+              <a:t> repository on composting. </a:t>
+            </a:r>
+          </a:p>
+          <a:p>
+            <a:pPr marL="171450" indent="-171450">
+              <a:buFont typeface="Arial" panose="020B0604020202020204" pitchFamily="34" charset="0"/>
+              <a:buChar char="•"/>
+            </a:pPr>
+            <a:r>
+              <a:rPr lang="en-US" baseline="0" dirty="0" smtClean="0"/>
+              <a:t>I’ll be caching everything I learn and gather in that resource.</a:t>
+            </a:r>
+            <a:endParaRPr lang="en-US" dirty="0" smtClean="0"/>
+          </a:p>
+          <a:p>
+            <a:pPr marL="171450" indent="-171450">
+              <a:buFont typeface="Arial" panose="020B0604020202020204" pitchFamily="34" charset="0"/>
+              <a:buChar char="•"/>
+            </a:pPr>
             <a:r>
               <a:rPr lang="en-US" dirty="0" smtClean="0"/>
               <a:t>Local</a:t>
             </a:r>
             <a:r>
               <a:rPr lang="en-US" baseline="0" dirty="0" smtClean="0"/>
-              <a:t> l</a:t>
+              <a:t> nurseries </a:t>
             </a:r>
             <a:r>
               <a:rPr lang="en-US" dirty="0" smtClean="0"/>
-              <a:t>ibraries have lots of books on gardening and composting.</a:t>
-            </a:r>
+              <a:t>may have interesting resources on gardening and composting</a:t>
+            </a:r>
+          </a:p>
+          <a:p>
+            <a:pPr marL="171450" indent="-171450">
+              <a:buFont typeface="Arial" panose="020B0604020202020204" pitchFamily="34" charset="0"/>
+              <a:buChar char="•"/>
+            </a:pPr>
             <a:r>
               <a:rPr lang="en-US" baseline="0" dirty="0" smtClean="0"/>
-              <a:t>  Do check these out!</a:t>
+              <a:t>I’d say libraries and B&amp;N stores for sure</a:t>
+            </a:r>
+          </a:p>
+          <a:p>
+            <a:pPr marL="171450" indent="-171450">
+              <a:buFont typeface="Arial" panose="020B0604020202020204" pitchFamily="34" charset="0"/>
+              <a:buChar char="•"/>
+            </a:pPr>
+            <a:r>
+              <a:rPr lang="en-US" baseline="0" dirty="0" smtClean="0"/>
+              <a:t>Do check these out!</a:t>
             </a:r>
             <a:endParaRPr lang="en-US" dirty="0"/>
           </a:p>
@@ -1461,98 +1523,6 @@
     <p:extLst>
       <p:ext uri="{BB962C8B-B14F-4D97-AF65-F5344CB8AC3E}">
         <p14:creationId xmlns:p14="http://schemas.microsoft.com/office/powerpoint/2010/main" val="2843257317"/>
-      </p:ext>
-    </p:extLst>
-  </p:cSld>
-  <p:clrMapOvr>
-    <a:masterClrMapping/>
-  </p:clrMapOvr>
-</p:notes>
-</file>
-
-<file path=ppt/notesSlides/notesSlide17.xml><?xml version="1.0" encoding="utf-8"?>
-<p:notes xmlns:a="http://schemas.openxmlformats.org/drawingml/2006/main" xmlns:r="http://schemas.openxmlformats.org/officeDocument/2006/relationships" xmlns:p="http://schemas.openxmlformats.org/presentationml/2006/main">
-  <p:cSld>
-    <p:spTree>
-      <p:nvGrpSpPr>
-        <p:cNvPr id="1" name=""/>
-        <p:cNvGrpSpPr/>
-        <p:nvPr/>
-      </p:nvGrpSpPr>
-      <p:grpSpPr>
-        <a:xfrm>
-          <a:off x="0" y="0"/>
-          <a:ext cx="0" cy="0"/>
-          <a:chOff x="0" y="0"/>
-          <a:chExt cx="0" cy="0"/>
-        </a:xfrm>
-      </p:grpSpPr>
-      <p:sp>
-        <p:nvSpPr>
-          <p:cNvPr id="2" name="Slide Image Placeholder 1"/>
-          <p:cNvSpPr>
-            <a:spLocks noGrp="1" noRot="1" noChangeAspect="1"/>
-          </p:cNvSpPr>
-          <p:nvPr>
-            <p:ph type="sldImg"/>
-          </p:nvPr>
-        </p:nvSpPr>
-        <p:spPr/>
-      </p:sp>
-      <p:sp>
-        <p:nvSpPr>
-          <p:cNvPr id="3" name="Notes Placeholder 2"/>
-          <p:cNvSpPr>
-            <a:spLocks noGrp="1"/>
-          </p:cNvSpPr>
-          <p:nvPr>
-            <p:ph type="body" idx="1"/>
-          </p:nvPr>
-        </p:nvSpPr>
-        <p:spPr/>
-        <p:txBody>
-          <a:bodyPr/>
-          <a:lstStyle/>
-          <a:p>
-            <a:r>
-              <a:rPr lang="en-US" dirty="0" smtClean="0"/>
-              <a:t>Thank</a:t>
-            </a:r>
-            <a:r>
-              <a:rPr lang="en-US" baseline="0" dirty="0" smtClean="0"/>
-              <a:t> you for your interest in backyard composting. You will help reduce the amount of plant materials and leaves in our landfill.  And you’ll create your own mulch!</a:t>
-            </a:r>
-            <a:endParaRPr lang="en-US" dirty="0"/>
-          </a:p>
-        </p:txBody>
-      </p:sp>
-      <p:sp>
-        <p:nvSpPr>
-          <p:cNvPr id="4" name="Slide Number Placeholder 3"/>
-          <p:cNvSpPr>
-            <a:spLocks noGrp="1"/>
-          </p:cNvSpPr>
-          <p:nvPr>
-            <p:ph type="sldNum" sz="quarter" idx="10"/>
-          </p:nvPr>
-        </p:nvSpPr>
-        <p:spPr/>
-        <p:txBody>
-          <a:bodyPr/>
-          <a:lstStyle/>
-          <a:p>
-            <a:fld id="{1619AC61-AAA7-44A3-8C24-EFE7CF2D4F0E}" type="slidenum">
-              <a:rPr lang="en-US" smtClean="0"/>
-              <a:t>17</a:t>
-            </a:fld>
-            <a:endParaRPr lang="en-US"/>
-          </a:p>
-        </p:txBody>
-      </p:sp>
-    </p:spTree>
-    <p:extLst>
-      <p:ext uri="{BB962C8B-B14F-4D97-AF65-F5344CB8AC3E}">
-        <p14:creationId xmlns:p14="http://schemas.microsoft.com/office/powerpoint/2010/main" val="419998896"/>
       </p:ext>
     </p:extLst>
   </p:cSld>
@@ -9360,7 +9330,7 @@
         </p:spPr>
         <p:txBody>
           <a:bodyPr>
-            <a:normAutofit fontScale="92500" lnSpcReduction="20000"/>
+            <a:normAutofit fontScale="85000" lnSpcReduction="20000"/>
           </a:bodyPr>
           <a:lstStyle/>
           <a:p>
@@ -9390,7 +9360,7 @@
           <a:p>
             <a:r>
               <a:rPr lang="en-US" dirty="0" smtClean="0"/>
-              <a:t>Home and Garden Information Center</a:t>
+              <a:t>My online personal knowledge repository on Composting</a:t>
             </a:r>
             <a:br>
               <a:rPr lang="en-US" dirty="0" smtClean="0"/>
@@ -9403,24 +9373,22 @@
               <a:rPr lang="en-US" dirty="0" smtClean="0">
                 <a:hlinkClick r:id="rId4"/>
               </a:rPr>
-              <a:t>http://</a:t>
-            </a:r>
-            <a:r>
-              <a:rPr lang="en-US" i="1" dirty="0" smtClean="0">
-                <a:hlinkClick r:id="rId4"/>
-              </a:rPr>
-              <a:t>some/website</a:t>
+              <a:t>https://github.com/berttejeda/bert.composting</a:t>
             </a:r>
             <a:endParaRPr lang="en-US" i="1" dirty="0" smtClean="0"/>
           </a:p>
           <a:p>
             <a:r>
               <a:rPr lang="en-US" dirty="0" smtClean="0"/>
-              <a:t>Home </a:t>
+              <a:t>Check nearby nurseries, libraries, B&amp;N, </a:t>
+            </a:r>
+            <a:r>
+              <a:rPr lang="en-US" dirty="0" err="1" smtClean="0"/>
+              <a:t>etc</a:t>
             </a:r>
             <a:r>
               <a:rPr lang="en-US" dirty="0"/>
-              <a:t>and Garden Information Center</a:t>
+              <a:t/>
             </a:r>
             <a:br>
               <a:rPr lang="en-US" dirty="0"/>
@@ -9430,16 +9398,22 @@
               <a:t>	</a:t>
             </a:r>
             <a:r>
-              <a:rPr lang="en-US" dirty="0">
-                <a:hlinkClick r:id="rId4"/>
+              <a:rPr lang="en-US" dirty="0" smtClean="0">
+                <a:hlinkClick r:id="rId5"/>
               </a:rPr>
-              <a:t>http://</a:t>
-            </a:r>
-            <a:r>
-              <a:rPr lang="en-US" i="1" dirty="0" smtClean="0">
-                <a:hlinkClick r:id="rId4"/>
+              <a:t>Let </a:t>
+            </a:r>
+            <a:r>
+              <a:rPr lang="en-US" smtClean="0">
+                <a:hlinkClick r:id="rId5"/>
               </a:rPr>
-              <a:t>some/website</a:t>
+              <a:t>Me Google </a:t>
+            </a:r>
+            <a:r>
+              <a:rPr lang="en-US" dirty="0" smtClean="0">
+                <a:hlinkClick r:id="rId5"/>
+              </a:rPr>
+              <a:t>That For You</a:t>
             </a:r>
             <a:endParaRPr lang="en-US" i="1" dirty="0" smtClean="0"/>
           </a:p>
@@ -9473,7 +9447,7 @@
           <p:nvPr/>
         </p:nvPicPr>
         <p:blipFill>
-          <a:blip r:embed="rId5">
+          <a:blip r:embed="rId6">
             <a:extLst>
               <a:ext uri="{28A0092B-C50C-407E-A947-70E740481C1C}">
                 <a14:useLocalDpi xmlns:a14="http://schemas.microsoft.com/office/drawing/2010/main" val="0"/>
@@ -9522,103 +9496,6 @@
     <p:extLst>
       <p:ext uri="{BB962C8B-B14F-4D97-AF65-F5344CB8AC3E}">
         <p14:creationId xmlns:p14="http://schemas.microsoft.com/office/powerpoint/2010/main" val="3798681523"/>
-      </p:ext>
-    </p:extLst>
-  </p:cSld>
-  <p:clrMapOvr>
-    <a:masterClrMapping/>
-  </p:clrMapOvr>
-  <p:timing>
-    <p:tnLst>
-      <p:par>
-        <p:cTn id="1" dur="indefinite" restart="never" nodeType="tmRoot"/>
-      </p:par>
-    </p:tnLst>
-  </p:timing>
-</p:sld>
-</file>
-
-<file path=ppt/slides/slide17.xml><?xml version="1.0" encoding="utf-8"?>
-<p:sld xmlns:a="http://schemas.openxmlformats.org/drawingml/2006/main" xmlns:r="http://schemas.openxmlformats.org/officeDocument/2006/relationships" xmlns:p="http://schemas.openxmlformats.org/presentationml/2006/main">
-  <p:cSld>
-    <p:bg>
-      <p:bgPr>
-        <a:solidFill>
-          <a:schemeClr val="bg1">
-            <a:lumMod val="85000"/>
-            <a:alpha val="59000"/>
-          </a:schemeClr>
-        </a:solidFill>
-        <a:effectLst/>
-      </p:bgPr>
-    </p:bg>
-    <p:spTree>
-      <p:nvGrpSpPr>
-        <p:cNvPr id="1" name=""/>
-        <p:cNvGrpSpPr/>
-        <p:nvPr/>
-      </p:nvGrpSpPr>
-      <p:grpSpPr>
-        <a:xfrm>
-          <a:off x="0" y="0"/>
-          <a:ext cx="0" cy="0"/>
-          <a:chOff x="0" y="0"/>
-          <a:chExt cx="0" cy="0"/>
-        </a:xfrm>
-      </p:grpSpPr>
-      <p:sp>
-        <p:nvSpPr>
-          <p:cNvPr id="2" name="TextBox 1"/>
-          <p:cNvSpPr txBox="1"/>
-          <p:nvPr/>
-        </p:nvSpPr>
-        <p:spPr>
-          <a:xfrm>
-            <a:off x="3657600" y="762000"/>
-            <a:ext cx="1643912" cy="369332"/>
-          </a:xfrm>
-          <a:prstGeom prst="rect">
-            <a:avLst/>
-          </a:prstGeom>
-          <a:noFill/>
-        </p:spPr>
-        <p:txBody>
-          <a:bodyPr wrap="none" rtlCol="0">
-            <a:spAutoFit/>
-          </a:bodyPr>
-          <a:lstStyle/>
-          <a:p>
-            <a:r>
-              <a:rPr lang="en-US" dirty="0" smtClean="0"/>
-              <a:t>SEI Green Team</a:t>
-            </a:r>
-            <a:endParaRPr lang="en-US" dirty="0"/>
-          </a:p>
-        </p:txBody>
-      </p:sp>
-      <p:sp>
-        <p:nvSpPr>
-          <p:cNvPr id="5" name="Content Placeholder 4"/>
-          <p:cNvSpPr>
-            <a:spLocks noGrp="1"/>
-          </p:cNvSpPr>
-          <p:nvPr>
-            <p:ph idx="1"/>
-          </p:nvPr>
-        </p:nvSpPr>
-        <p:spPr/>
-        <p:txBody>
-          <a:bodyPr/>
-          <a:lstStyle/>
-          <a:p>
-            <a:endParaRPr lang="en-US"/>
-          </a:p>
-        </p:txBody>
-      </p:sp>
-    </p:spTree>
-    <p:extLst>
-      <p:ext uri="{BB962C8B-B14F-4D97-AF65-F5344CB8AC3E}">
-        <p14:creationId xmlns:p14="http://schemas.microsoft.com/office/powerpoint/2010/main" val="372409779"/>
       </p:ext>
     </p:extLst>
   </p:cSld>

</xml_diff>

<commit_message>
New graphic - anatomy of a compost pile
</commit_message>
<xml_diff>
--- a/Compost Presentation.pptx
+++ b/Compost Presentation.pptx
@@ -551,7 +551,19 @@
           <a:p>
             <a:r>
               <a:rPr lang="en-US" baseline="0" dirty="0" smtClean="0"/>
-              <a:t>And so on that note, I’ll be presenting you folks with a quick into to composting.</a:t>
+              <a:t>And so on that note, I’ll be presenting you folks with a </a:t>
+            </a:r>
+            <a:r>
+              <a:rPr lang="en-US" baseline="0" smtClean="0"/>
+              <a:t>quick </a:t>
+            </a:r>
+            <a:r>
+              <a:rPr lang="en-US" baseline="0" smtClean="0"/>
+              <a:t>intro </a:t>
+            </a:r>
+            <a:r>
+              <a:rPr lang="en-US" baseline="0" dirty="0" smtClean="0"/>
+              <a:t>to composting.</a:t>
             </a:r>
           </a:p>
           <a:p>
@@ -6473,6 +6485,13 @@
   <p:clrMapOvr>
     <a:masterClrMapping/>
   </p:clrMapOvr>
+  <p:timing>
+    <p:tnLst>
+      <p:par>
+        <p:cTn id="1" dur="indefinite" restart="never" nodeType="tmRoot"/>
+      </p:par>
+    </p:tnLst>
+  </p:timing>
 </p:sld>
 </file>
 
@@ -9781,45 +9800,46 @@
           <a:lstStyle/>
           <a:p>
             <a:r>
-              <a:rPr lang="en-US" dirty="0" smtClean="0"/>
+              <a:rPr lang="en-US" sz="2400" dirty="0" smtClean="0"/>
               <a:t>Organic material from decomposition  of </a:t>
             </a:r>
             <a:r>
-              <a:rPr lang="en-US" dirty="0"/>
+              <a:rPr lang="en-US" sz="2400" dirty="0"/>
               <a:t>carbon (</a:t>
             </a:r>
             <a:r>
-              <a:rPr lang="en-US" i="1" dirty="0"/>
+              <a:rPr lang="en-US" sz="2400" i="1" dirty="0"/>
               <a:t>dried </a:t>
             </a:r>
             <a:r>
-              <a:rPr lang="en-US" i="1" dirty="0" smtClean="0"/>
+              <a:rPr lang="en-US" sz="2400" i="1" dirty="0" smtClean="0"/>
               <a:t>leaves</a:t>
             </a:r>
             <a:r>
-              <a:rPr lang="en-US" dirty="0" smtClean="0"/>
+              <a:rPr lang="en-US" sz="2400" dirty="0" smtClean="0"/>
               <a:t>), nitrogen (</a:t>
             </a:r>
             <a:r>
-              <a:rPr lang="en-US" i="1" dirty="0" smtClean="0"/>
+              <a:rPr lang="en-US" sz="2400" i="1" dirty="0" smtClean="0"/>
               <a:t>food scraps</a:t>
             </a:r>
             <a:r>
-              <a:rPr lang="en-US" dirty="0" smtClean="0"/>
+              <a:rPr lang="en-US" sz="2400" dirty="0" smtClean="0"/>
               <a:t>). </a:t>
             </a:r>
           </a:p>
           <a:p>
             <a:r>
-              <a:rPr lang="en-US" dirty="0" smtClean="0"/>
+              <a:rPr lang="en-US" sz="2400" dirty="0" smtClean="0"/>
               <a:t>Happens naturally – certain techniques accelerate the process.</a:t>
             </a:r>
           </a:p>
           <a:p>
             <a:r>
-              <a:rPr lang="en-US" dirty="0" smtClean="0"/>
+              <a:rPr lang="en-US" sz="2400" dirty="0" smtClean="0"/>
               <a:t>Dark, crumbly, soil-like.</a:t>
             </a:r>
+            <a:endParaRPr lang="en-US" dirty="0" smtClean="0"/>
           </a:p>
           <a:p>
             <a:endParaRPr lang="en-US" dirty="0"/>
@@ -9848,7 +9868,7 @@
         </p:blipFill>
         <p:spPr>
           <a:xfrm>
-            <a:off x="5334000" y="3886200"/>
+            <a:off x="1371600" y="3962400"/>
             <a:ext cx="3295650" cy="2471738"/>
           </a:xfrm>
           <a:prstGeom prst="rect">
@@ -9859,6 +9879,187 @@
               <a:schemeClr val="tx1"/>
             </a:solidFill>
           </a:ln>
+        </p:spPr>
+      </p:pic>
+      <p:sp>
+        <p:nvSpPr>
+          <p:cNvPr id="4" name="AutoShape 2" descr="Image result for anatomy of compost pile"/>
+          <p:cNvSpPr>
+            <a:spLocks noChangeAspect="1" noChangeArrowheads="1"/>
+          </p:cNvSpPr>
+          <p:nvPr/>
+        </p:nvSpPr>
+        <p:spPr bwMode="auto">
+          <a:xfrm>
+            <a:off x="155575" y="-144463"/>
+            <a:ext cx="304800" cy="304801"/>
+          </a:xfrm>
+          <a:prstGeom prst="rect">
+            <a:avLst/>
+          </a:prstGeom>
+          <a:noFill/>
+          <a:extLst>
+            <a:ext uri="{909E8E84-426E-40DD-AFC4-6F175D3DCCD1}">
+              <a14:hiddenFill xmlns:a14="http://schemas.microsoft.com/office/drawing/2010/main">
+                <a:solidFill>
+                  <a:srgbClr val="FFFFFF"/>
+                </a:solidFill>
+              </a14:hiddenFill>
+            </a:ext>
+          </a:extLst>
+        </p:spPr>
+        <p:txBody>
+          <a:bodyPr vert="horz" wrap="square" lIns="91440" tIns="45720" rIns="91440" bIns="45720" numCol="1" anchor="t" anchorCtr="0" compatLnSpc="1">
+            <a:prstTxWarp prst="textNoShape">
+              <a:avLst/>
+            </a:prstTxWarp>
+          </a:bodyPr>
+          <a:lstStyle/>
+          <a:p>
+            <a:endParaRPr lang="en-US"/>
+          </a:p>
+        </p:txBody>
+      </p:sp>
+      <p:sp>
+        <p:nvSpPr>
+          <p:cNvPr id="6" name="AutoShape 4" descr="Image result for anatomy of compost pile"/>
+          <p:cNvSpPr>
+            <a:spLocks noChangeAspect="1" noChangeArrowheads="1"/>
+          </p:cNvSpPr>
+          <p:nvPr/>
+        </p:nvSpPr>
+        <p:spPr bwMode="auto">
+          <a:xfrm>
+            <a:off x="307975" y="7937"/>
+            <a:ext cx="304800" cy="304801"/>
+          </a:xfrm>
+          <a:prstGeom prst="rect">
+            <a:avLst/>
+          </a:prstGeom>
+          <a:noFill/>
+          <a:extLst>
+            <a:ext uri="{909E8E84-426E-40DD-AFC4-6F175D3DCCD1}">
+              <a14:hiddenFill xmlns:a14="http://schemas.microsoft.com/office/drawing/2010/main">
+                <a:solidFill>
+                  <a:srgbClr val="FFFFFF"/>
+                </a:solidFill>
+              </a14:hiddenFill>
+            </a:ext>
+          </a:extLst>
+        </p:spPr>
+        <p:txBody>
+          <a:bodyPr vert="horz" wrap="square" lIns="91440" tIns="45720" rIns="91440" bIns="45720" numCol="1" anchor="t" anchorCtr="0" compatLnSpc="1">
+            <a:prstTxWarp prst="textNoShape">
+              <a:avLst/>
+            </a:prstTxWarp>
+          </a:bodyPr>
+          <a:lstStyle/>
+          <a:p>
+            <a:endParaRPr lang="en-US"/>
+          </a:p>
+        </p:txBody>
+      </p:sp>
+      <p:sp>
+        <p:nvSpPr>
+          <p:cNvPr id="7" name="AutoShape 6" descr="Image result for anatomy of compost pile"/>
+          <p:cNvSpPr>
+            <a:spLocks noChangeAspect="1" noChangeArrowheads="1"/>
+          </p:cNvSpPr>
+          <p:nvPr/>
+        </p:nvSpPr>
+        <p:spPr bwMode="auto">
+          <a:xfrm>
+            <a:off x="460375" y="160337"/>
+            <a:ext cx="304800" cy="304801"/>
+          </a:xfrm>
+          <a:prstGeom prst="rect">
+            <a:avLst/>
+          </a:prstGeom>
+          <a:noFill/>
+          <a:extLst>
+            <a:ext uri="{909E8E84-426E-40DD-AFC4-6F175D3DCCD1}">
+              <a14:hiddenFill xmlns:a14="http://schemas.microsoft.com/office/drawing/2010/main">
+                <a:solidFill>
+                  <a:srgbClr val="FFFFFF"/>
+                </a:solidFill>
+              </a14:hiddenFill>
+            </a:ext>
+          </a:extLst>
+        </p:spPr>
+        <p:txBody>
+          <a:bodyPr vert="horz" wrap="square" lIns="91440" tIns="45720" rIns="91440" bIns="45720" numCol="1" anchor="t" anchorCtr="0" compatLnSpc="1">
+            <a:prstTxWarp prst="textNoShape">
+              <a:avLst/>
+            </a:prstTxWarp>
+          </a:bodyPr>
+          <a:lstStyle/>
+          <a:p>
+            <a:endParaRPr lang="en-US"/>
+          </a:p>
+        </p:txBody>
+      </p:sp>
+      <p:pic>
+        <p:nvPicPr>
+          <p:cNvPr id="1031" name="Picture 7"/>
+          <p:cNvPicPr>
+            <a:picLocks noChangeAspect="1" noChangeArrowheads="1"/>
+          </p:cNvPicPr>
+          <p:nvPr/>
+        </p:nvPicPr>
+        <p:blipFill>
+          <a:blip r:embed="rId4">
+            <a:extLst>
+              <a:ext uri="{28A0092B-C50C-407E-A947-70E740481C1C}">
+                <a14:useLocalDpi xmlns:a14="http://schemas.microsoft.com/office/drawing/2010/main" val="0"/>
+              </a:ext>
+            </a:extLst>
+          </a:blip>
+          <a:srcRect/>
+          <a:stretch>
+            <a:fillRect/>
+          </a:stretch>
+        </p:blipFill>
+        <p:spPr bwMode="auto">
+          <a:xfrm>
+            <a:off x="5486400" y="2777766"/>
+            <a:ext cx="2895600" cy="3915452"/>
+          </a:xfrm>
+          <a:prstGeom prst="rect">
+            <a:avLst/>
+          </a:prstGeom>
+          <a:noFill/>
+          <a:ln>
+            <a:noFill/>
+          </a:ln>
+          <a:effectLst/>
+          <a:extLst>
+            <a:ext uri="{909E8E84-426E-40DD-AFC4-6F175D3DCCD1}">
+              <a14:hiddenFill xmlns:a14="http://schemas.microsoft.com/office/drawing/2010/main">
+                <a:solidFill>
+                  <a:schemeClr val="accent1"/>
+                </a:solidFill>
+              </a14:hiddenFill>
+            </a:ext>
+            <a:ext uri="{91240B29-F687-4F45-9708-019B960494DF}">
+              <a14:hiddenLine xmlns:a14="http://schemas.microsoft.com/office/drawing/2010/main" w="9525">
+                <a:solidFill>
+                  <a:schemeClr val="tx1"/>
+                </a:solidFill>
+                <a:miter lim="800000"/>
+                <a:headEnd/>
+                <a:tailEnd/>
+              </a14:hiddenLine>
+            </a:ext>
+            <a:ext uri="{AF507438-7753-43E0-B8FC-AC1667EBCBE1}">
+              <a14:hiddenEffects xmlns:a14="http://schemas.microsoft.com/office/drawing/2010/main">
+                <a:effectLst>
+                  <a:outerShdw dist="35921" dir="2700000" algn="ctr" rotWithShape="0">
+                    <a:schemeClr val="bg2"/>
+                  </a:outerShdw>
+                </a:effectLst>
+              </a14:hiddenEffects>
+            </a:ext>
+          </a:extLst>
         </p:spPr>
       </p:pic>
     </p:spTree>

</xml_diff>

<commit_message>
Fixed spelling error in slide 13
</commit_message>
<xml_diff>
--- a/Compost Presentation.pptx
+++ b/Compost Presentation.pptx
@@ -207,7 +207,7 @@
           <a:p>
             <a:fld id="{0CC7CC4A-76C7-4FD5-872A-EA70F810BA67}" type="datetimeFigureOut">
               <a:rPr lang="en-US" smtClean="0"/>
-              <a:t>4/18/2018</a:t>
+              <a:t>5/16/2019</a:t>
             </a:fld>
             <a:endParaRPr lang="en-US"/>
           </a:p>
@@ -555,11 +555,7 @@
             </a:r>
             <a:r>
               <a:rPr lang="en-US" baseline="0" smtClean="0"/>
-              <a:t>quick </a:t>
-            </a:r>
-            <a:r>
-              <a:rPr lang="en-US" baseline="0" smtClean="0"/>
-              <a:t>intro </a:t>
+              <a:t>quick intro </a:t>
             </a:r>
             <a:r>
               <a:rPr lang="en-US" baseline="0" dirty="0" smtClean="0"/>
@@ -3495,7 +3491,7 @@
           <a:p>
             <a:fld id="{23106D07-29B8-4C3C-B3FB-5E0D11A8336A}" type="datetimeFigureOut">
               <a:rPr lang="en-US" smtClean="0"/>
-              <a:t>4/18/2018</a:t>
+              <a:t>5/16/2019</a:t>
             </a:fld>
             <a:endParaRPr lang="en-US"/>
           </a:p>
@@ -3665,7 +3661,7 @@
           <a:p>
             <a:fld id="{23106D07-29B8-4C3C-B3FB-5E0D11A8336A}" type="datetimeFigureOut">
               <a:rPr lang="en-US" smtClean="0"/>
-              <a:t>4/18/2018</a:t>
+              <a:t>5/16/2019</a:t>
             </a:fld>
             <a:endParaRPr lang="en-US"/>
           </a:p>
@@ -3845,7 +3841,7 @@
           <a:p>
             <a:fld id="{23106D07-29B8-4C3C-B3FB-5E0D11A8336A}" type="datetimeFigureOut">
               <a:rPr lang="en-US" smtClean="0"/>
-              <a:t>4/18/2018</a:t>
+              <a:t>5/16/2019</a:t>
             </a:fld>
             <a:endParaRPr lang="en-US"/>
           </a:p>
@@ -4015,7 +4011,7 @@
           <a:p>
             <a:fld id="{23106D07-29B8-4C3C-B3FB-5E0D11A8336A}" type="datetimeFigureOut">
               <a:rPr lang="en-US" smtClean="0"/>
-              <a:t>4/18/2018</a:t>
+              <a:t>5/16/2019</a:t>
             </a:fld>
             <a:endParaRPr lang="en-US"/>
           </a:p>
@@ -4261,7 +4257,7 @@
           <a:p>
             <a:fld id="{23106D07-29B8-4C3C-B3FB-5E0D11A8336A}" type="datetimeFigureOut">
               <a:rPr lang="en-US" smtClean="0"/>
-              <a:t>4/18/2018</a:t>
+              <a:t>5/16/2019</a:t>
             </a:fld>
             <a:endParaRPr lang="en-US"/>
           </a:p>
@@ -4549,7 +4545,7 @@
           <a:p>
             <a:fld id="{23106D07-29B8-4C3C-B3FB-5E0D11A8336A}" type="datetimeFigureOut">
               <a:rPr lang="en-US" smtClean="0"/>
-              <a:t>4/18/2018</a:t>
+              <a:t>5/16/2019</a:t>
             </a:fld>
             <a:endParaRPr lang="en-US"/>
           </a:p>
@@ -4971,7 +4967,7 @@
           <a:p>
             <a:fld id="{23106D07-29B8-4C3C-B3FB-5E0D11A8336A}" type="datetimeFigureOut">
               <a:rPr lang="en-US" smtClean="0"/>
-              <a:t>4/18/2018</a:t>
+              <a:t>5/16/2019</a:t>
             </a:fld>
             <a:endParaRPr lang="en-US"/>
           </a:p>
@@ -5089,7 +5085,7 @@
           <a:p>
             <a:fld id="{23106D07-29B8-4C3C-B3FB-5E0D11A8336A}" type="datetimeFigureOut">
               <a:rPr lang="en-US" smtClean="0"/>
-              <a:t>4/18/2018</a:t>
+              <a:t>5/16/2019</a:t>
             </a:fld>
             <a:endParaRPr lang="en-US"/>
           </a:p>
@@ -5184,7 +5180,7 @@
           <a:p>
             <a:fld id="{23106D07-29B8-4C3C-B3FB-5E0D11A8336A}" type="datetimeFigureOut">
               <a:rPr lang="en-US" smtClean="0"/>
-              <a:t>4/18/2018</a:t>
+              <a:t>5/16/2019</a:t>
             </a:fld>
             <a:endParaRPr lang="en-US"/>
           </a:p>
@@ -5461,7 +5457,7 @@
           <a:p>
             <a:fld id="{23106D07-29B8-4C3C-B3FB-5E0D11A8336A}" type="datetimeFigureOut">
               <a:rPr lang="en-US" smtClean="0"/>
-              <a:t>4/18/2018</a:t>
+              <a:t>5/16/2019</a:t>
             </a:fld>
             <a:endParaRPr lang="en-US"/>
           </a:p>
@@ -5714,7 +5710,7 @@
           <a:p>
             <a:fld id="{23106D07-29B8-4C3C-B3FB-5E0D11A8336A}" type="datetimeFigureOut">
               <a:rPr lang="en-US" smtClean="0"/>
-              <a:t>4/18/2018</a:t>
+              <a:t>5/16/2019</a:t>
             </a:fld>
             <a:endParaRPr lang="en-US"/>
           </a:p>
@@ -5927,7 +5923,7 @@
           <a:p>
             <a:fld id="{23106D07-29B8-4C3C-B3FB-5E0D11A8336A}" type="datetimeFigureOut">
               <a:rPr lang="en-US" smtClean="0"/>
-              <a:t>4/18/2018</a:t>
+              <a:t>5/16/2019</a:t>
             </a:fld>
             <a:endParaRPr lang="en-US"/>
           </a:p>
@@ -7464,6 +7460,34 @@
       </p:grpSpPr>
       <p:sp>
         <p:nvSpPr>
+          <p:cNvPr id="3" name="Content Placeholder 2"/>
+          <p:cNvSpPr>
+            <a:spLocks noGrp="1"/>
+          </p:cNvSpPr>
+          <p:nvPr>
+            <p:ph idx="1"/>
+          </p:nvPr>
+        </p:nvSpPr>
+        <p:spPr/>
+        <p:txBody>
+          <a:bodyPr/>
+          <a:lstStyle/>
+          <a:p>
+            <a:pPr marL="0" indent="0">
+              <a:buNone/>
+            </a:pPr>
+            <a:endParaRPr lang="en-US" dirty="0" smtClean="0"/>
+          </a:p>
+          <a:p>
+            <a:endParaRPr lang="en-US" dirty="0" smtClean="0"/>
+          </a:p>
+          <a:p>
+            <a:endParaRPr lang="en-US" dirty="0"/>
+          </a:p>
+        </p:txBody>
+      </p:sp>
+      <p:sp>
+        <p:nvSpPr>
           <p:cNvPr id="5" name="TextBox 4"/>
           <p:cNvSpPr txBox="1"/>
           <p:nvPr/>
@@ -7529,18 +7553,18 @@
               <a:t>  Add browns such as leaves, straw, or shredded </a:t>
             </a:r>
             <a:r>
-              <a:rPr lang="en-US" sz="2400" dirty="0" err="1" smtClean="0">
-                <a:latin typeface="Arial" panose="020B0604020202020204" pitchFamily="34" charset="0"/>
-                <a:cs typeface="Arial" panose="020B0604020202020204" pitchFamily="34" charset="0"/>
-              </a:rPr>
-              <a:t>cardboad</a:t>
-            </a:r>
-            <a:r>
               <a:rPr lang="en-US" sz="2400" dirty="0" smtClean="0">
                 <a:latin typeface="Arial" panose="020B0604020202020204" pitchFamily="34" charset="0"/>
                 <a:cs typeface="Arial" panose="020B0604020202020204" pitchFamily="34" charset="0"/>
               </a:rPr>
-              <a:t>/paper, bury food scraps, turn pile</a:t>
+              <a:t>cardboard/paper</a:t>
+            </a:r>
+            <a:r>
+              <a:rPr lang="en-US" sz="2400" dirty="0" smtClean="0">
+                <a:latin typeface="Arial" panose="020B0604020202020204" pitchFamily="34" charset="0"/>
+                <a:cs typeface="Arial" panose="020B0604020202020204" pitchFamily="34" charset="0"/>
+              </a:rPr>
+              <a:t>, bury food scraps, turn pile</a:t>
             </a:r>
           </a:p>
           <a:p>
@@ -7685,34 +7709,6 @@
               <a:t>Troubleshooting</a:t>
             </a:r>
             <a:endParaRPr lang="en-US" b="1" dirty="0"/>
-          </a:p>
-        </p:txBody>
-      </p:sp>
-      <p:sp>
-        <p:nvSpPr>
-          <p:cNvPr id="3" name="Content Placeholder 2"/>
-          <p:cNvSpPr>
-            <a:spLocks noGrp="1"/>
-          </p:cNvSpPr>
-          <p:nvPr>
-            <p:ph idx="1"/>
-          </p:nvPr>
-        </p:nvSpPr>
-        <p:spPr/>
-        <p:txBody>
-          <a:bodyPr/>
-          <a:lstStyle/>
-          <a:p>
-            <a:pPr marL="0" indent="0">
-              <a:buNone/>
-            </a:pPr>
-            <a:endParaRPr lang="en-US" dirty="0" smtClean="0"/>
-          </a:p>
-          <a:p>
-            <a:endParaRPr lang="en-US" dirty="0" smtClean="0"/>
-          </a:p>
-          <a:p>
-            <a:endParaRPr lang="en-US" dirty="0"/>
           </a:p>
         </p:txBody>
       </p:sp>
@@ -9163,7 +9159,7 @@
         <p:spPr>
           <a:xfrm>
             <a:off x="762000" y="1447800"/>
-            <a:ext cx="7848600" cy="1169551"/>
+            <a:ext cx="7848600" cy="1477328"/>
           </a:xfrm>
           <a:prstGeom prst="rect">
             <a:avLst/>
@@ -9181,7 +9177,21 @@
                 <a:latin typeface="Arial" panose="020B0604020202020204" pitchFamily="34" charset="0"/>
                 <a:cs typeface="Arial" panose="020B0604020202020204" pitchFamily="34" charset="0"/>
               </a:rPr>
-              <a:t>Master Gardeners in our area offer how-to advice at various locations in Montgomery County from April to November. Call your local recycling program. You may qualify for a free compost bin!</a:t>
+              <a:t>Master Gardeners in our area offer how-to advice at various locations in Montgomery </a:t>
+            </a:r>
+            <a:r>
+              <a:rPr lang="en-US" sz="2000" dirty="0" smtClean="0">
+                <a:latin typeface="Arial" panose="020B0604020202020204" pitchFamily="34" charset="0"/>
+                <a:cs typeface="Arial" panose="020B0604020202020204" pitchFamily="34" charset="0"/>
+              </a:rPr>
+              <a:t>County (PA) </a:t>
+            </a:r>
+            <a:r>
+              <a:rPr lang="en-US" sz="2000" dirty="0" smtClean="0">
+                <a:latin typeface="Arial" panose="020B0604020202020204" pitchFamily="34" charset="0"/>
+                <a:cs typeface="Arial" panose="020B0604020202020204" pitchFamily="34" charset="0"/>
+              </a:rPr>
+              <a:t>from April to November. Call your local recycling program. You may qualify for a free compost bin!</a:t>
             </a:r>
             <a:br>
               <a:rPr lang="en-US" sz="2000" dirty="0" smtClean="0">

</xml_diff>

<commit_message>
Various formatting improvements Added 'Shopping List' slide
</commit_message>
<xml_diff>
--- a/Compost Presentation.pptx
+++ b/Compost Presentation.pptx
@@ -5,7 +5,7 @@
     <p:sldMasterId id="2147483792" r:id="rId1"/>
   </p:sldMasterIdLst>
   <p:notesMasterIdLst>
-    <p:notesMasterId r:id="rId18"/>
+    <p:notesMasterId r:id="rId19"/>
   </p:notesMasterIdLst>
   <p:sldIdLst>
     <p:sldId id="279" r:id="rId2"/>
@@ -24,6 +24,7 @@
     <p:sldId id="272" r:id="rId15"/>
     <p:sldId id="269" r:id="rId16"/>
     <p:sldId id="278" r:id="rId17"/>
+    <p:sldId id="280" r:id="rId18"/>
   </p:sldIdLst>
   <p:sldSz cx="9144000" cy="6858000" type="screen4x3"/>
   <p:notesSz cx="6858000" cy="9144000"/>
@@ -207,7 +208,7 @@
           <a:p>
             <a:fld id="{0CC7CC4A-76C7-4FD5-872A-EA70F810BA67}" type="datetimeFigureOut">
               <a:rPr lang="en-US" smtClean="0"/>
-              <a:t>5/16/2019</a:t>
+              <a:t>6/28/2019</a:t>
             </a:fld>
             <a:endParaRPr lang="en-US"/>
           </a:p>
@@ -1540,6 +1541,194 @@
 </p:notes>
 </file>
 
+<file path=ppt/notesSlides/notesSlide17.xml><?xml version="1.0" encoding="utf-8"?>
+<p:notes xmlns:a="http://schemas.openxmlformats.org/drawingml/2006/main" xmlns:r="http://schemas.openxmlformats.org/officeDocument/2006/relationships" xmlns:p="http://schemas.openxmlformats.org/presentationml/2006/main">
+  <p:cSld>
+    <p:spTree>
+      <p:nvGrpSpPr>
+        <p:cNvPr id="1" name=""/>
+        <p:cNvGrpSpPr/>
+        <p:nvPr/>
+      </p:nvGrpSpPr>
+      <p:grpSpPr>
+        <a:xfrm>
+          <a:off x="0" y="0"/>
+          <a:ext cx="0" cy="0"/>
+          <a:chOff x="0" y="0"/>
+          <a:chExt cx="0" cy="0"/>
+        </a:xfrm>
+      </p:grpSpPr>
+      <p:sp>
+        <p:nvSpPr>
+          <p:cNvPr id="2" name="Slide Image Placeholder 1"/>
+          <p:cNvSpPr>
+            <a:spLocks noGrp="1" noRot="1" noChangeAspect="1"/>
+          </p:cNvSpPr>
+          <p:nvPr>
+            <p:ph type="sldImg"/>
+          </p:nvPr>
+        </p:nvSpPr>
+        <p:spPr/>
+      </p:sp>
+      <p:sp>
+        <p:nvSpPr>
+          <p:cNvPr id="3" name="Notes Placeholder 2"/>
+          <p:cNvSpPr>
+            <a:spLocks noGrp="1"/>
+          </p:cNvSpPr>
+          <p:nvPr>
+            <p:ph type="body" idx="1"/>
+          </p:nvPr>
+        </p:nvSpPr>
+        <p:spPr/>
+        <p:txBody>
+          <a:bodyPr/>
+          <a:lstStyle/>
+          <a:p>
+            <a:pPr marL="171450" indent="-171450">
+              <a:buFont typeface="Arial" panose="020B0604020202020204" pitchFamily="34" charset="0"/>
+              <a:buChar char="•"/>
+            </a:pPr>
+            <a:r>
+              <a:rPr lang="en-US" dirty="0" smtClean="0"/>
+              <a:t>These</a:t>
+            </a:r>
+            <a:r>
+              <a:rPr lang="en-US" baseline="0" dirty="0" smtClean="0"/>
+              <a:t> are some products you folks can look at on Amazon</a:t>
+            </a:r>
+            <a:endParaRPr lang="en-US" dirty="0" smtClean="0"/>
+          </a:p>
+          <a:p>
+            <a:pPr marL="171450" indent="-171450">
+              <a:buFont typeface="Arial" panose="020B0604020202020204" pitchFamily="34" charset="0"/>
+              <a:buChar char="•"/>
+            </a:pPr>
+            <a:r>
+              <a:rPr lang="en-US" dirty="0" smtClean="0"/>
+              <a:t>I actually</a:t>
+            </a:r>
+            <a:r>
+              <a:rPr lang="en-US" baseline="0" dirty="0" smtClean="0"/>
+              <a:t> use the second item here, and have had great results</a:t>
+            </a:r>
+          </a:p>
+          <a:p>
+            <a:pPr marL="628650" lvl="1" indent="-171450">
+              <a:buFont typeface="Arial" panose="020B0604020202020204" pitchFamily="34" charset="0"/>
+              <a:buChar char="•"/>
+            </a:pPr>
+            <a:r>
+              <a:rPr lang="en-US" baseline="0" dirty="0" smtClean="0"/>
+              <a:t>My food-waste to food-security workflow is:</a:t>
+            </a:r>
+          </a:p>
+          <a:p>
+            <a:pPr marL="1085850" lvl="2" indent="-171450">
+              <a:buFont typeface="Arial" panose="020B0604020202020204" pitchFamily="34" charset="0"/>
+              <a:buChar char="•"/>
+            </a:pPr>
+            <a:r>
+              <a:rPr lang="en-US" baseline="0" dirty="0" smtClean="0"/>
+              <a:t>Throw food-scraps and browns in the Kitchen compost bin</a:t>
+            </a:r>
+          </a:p>
+          <a:p>
+            <a:pPr marL="1085850" lvl="2" indent="-171450">
+              <a:buFont typeface="Arial" panose="020B0604020202020204" pitchFamily="34" charset="0"/>
+              <a:buChar char="•"/>
+            </a:pPr>
+            <a:r>
+              <a:rPr lang="en-US" baseline="0" dirty="0" smtClean="0"/>
+              <a:t>On average, it fills up every 8 days or so, </a:t>
+            </a:r>
+            <a:r>
+              <a:rPr lang="en-US" baseline="0" dirty="0" err="1" smtClean="0"/>
+              <a:t>afterwhich</a:t>
+            </a:r>
+            <a:r>
+              <a:rPr lang="en-US" baseline="0" dirty="0" smtClean="0"/>
+              <a:t> I</a:t>
+            </a:r>
+          </a:p>
+          <a:p>
+            <a:pPr marL="1543050" lvl="3" indent="-171450">
+              <a:buFont typeface="Arial" panose="020B0604020202020204" pitchFamily="34" charset="0"/>
+              <a:buChar char="•"/>
+            </a:pPr>
+            <a:r>
+              <a:rPr lang="en-US" baseline="0" dirty="0" smtClean="0"/>
+              <a:t>Empty the contents into my ‘active’ compost pile</a:t>
+            </a:r>
+          </a:p>
+          <a:p>
+            <a:pPr marL="1543050" lvl="3" indent="-171450">
+              <a:buFont typeface="Arial" panose="020B0604020202020204" pitchFamily="34" charset="0"/>
+              <a:buChar char="•"/>
+            </a:pPr>
+            <a:r>
+              <a:rPr lang="en-US" baseline="0" dirty="0" smtClean="0"/>
+              <a:t>Add browns and moisture if needed</a:t>
+            </a:r>
+          </a:p>
+          <a:p>
+            <a:pPr marL="1543050" lvl="3" indent="-171450">
+              <a:buFont typeface="Arial" panose="020B0604020202020204" pitchFamily="34" charset="0"/>
+              <a:buChar char="•"/>
+            </a:pPr>
+            <a:r>
+              <a:rPr lang="en-US" baseline="0" dirty="0" smtClean="0"/>
+              <a:t>Turn the pile with my pitch fork</a:t>
+            </a:r>
+          </a:p>
+          <a:p>
+            <a:pPr marL="1085850" lvl="2" indent="-171450">
+              <a:buFont typeface="Arial" panose="020B0604020202020204" pitchFamily="34" charset="0"/>
+              <a:buChar char="•"/>
+            </a:pPr>
+            <a:r>
+              <a:rPr lang="en-US" baseline="0" dirty="0" smtClean="0"/>
+              <a:t>In the Winter time, I utilize bigger containers as intermediary holding bins to lessen the need to out in the bitter cold</a:t>
+            </a:r>
+          </a:p>
+        </p:txBody>
+      </p:sp>
+      <p:sp>
+        <p:nvSpPr>
+          <p:cNvPr id="4" name="Slide Number Placeholder 3"/>
+          <p:cNvSpPr>
+            <a:spLocks noGrp="1"/>
+          </p:cNvSpPr>
+          <p:nvPr>
+            <p:ph type="sldNum" sz="quarter" idx="10"/>
+          </p:nvPr>
+        </p:nvSpPr>
+        <p:spPr/>
+        <p:txBody>
+          <a:bodyPr/>
+          <a:lstStyle/>
+          <a:p>
+            <a:fld id="{1619AC61-AAA7-44A3-8C24-EFE7CF2D4F0E}" type="slidenum">
+              <a:rPr lang="en-US" smtClean="0"/>
+              <a:t>17</a:t>
+            </a:fld>
+            <a:endParaRPr lang="en-US"/>
+          </a:p>
+        </p:txBody>
+      </p:sp>
+    </p:spTree>
+    <p:extLst>
+      <p:ext uri="{BB962C8B-B14F-4D97-AF65-F5344CB8AC3E}">
+        <p14:creationId xmlns:p14="http://schemas.microsoft.com/office/powerpoint/2010/main" val="2843257317"/>
+      </p:ext>
+    </p:extLst>
+  </p:cSld>
+  <p:clrMapOvr>
+    <a:masterClrMapping/>
+  </p:clrMapOvr>
+</p:notes>
+</file>
+
 <file path=ppt/notesSlides/notesSlide2.xml><?xml version="1.0" encoding="utf-8"?>
 <p:notes xmlns:a="http://schemas.openxmlformats.org/drawingml/2006/main" xmlns:r="http://schemas.openxmlformats.org/officeDocument/2006/relationships" xmlns:p="http://schemas.openxmlformats.org/presentationml/2006/main">
   <p:cSld>
@@ -3491,7 +3680,7 @@
           <a:p>
             <a:fld id="{23106D07-29B8-4C3C-B3FB-5E0D11A8336A}" type="datetimeFigureOut">
               <a:rPr lang="en-US" smtClean="0"/>
-              <a:t>5/16/2019</a:t>
+              <a:t>6/28/2019</a:t>
             </a:fld>
             <a:endParaRPr lang="en-US"/>
           </a:p>
@@ -3661,7 +3850,7 @@
           <a:p>
             <a:fld id="{23106D07-29B8-4C3C-B3FB-5E0D11A8336A}" type="datetimeFigureOut">
               <a:rPr lang="en-US" smtClean="0"/>
-              <a:t>5/16/2019</a:t>
+              <a:t>6/28/2019</a:t>
             </a:fld>
             <a:endParaRPr lang="en-US"/>
           </a:p>
@@ -3841,7 +4030,7 @@
           <a:p>
             <a:fld id="{23106D07-29B8-4C3C-B3FB-5E0D11A8336A}" type="datetimeFigureOut">
               <a:rPr lang="en-US" smtClean="0"/>
-              <a:t>5/16/2019</a:t>
+              <a:t>6/28/2019</a:t>
             </a:fld>
             <a:endParaRPr lang="en-US"/>
           </a:p>
@@ -4011,7 +4200,7 @@
           <a:p>
             <a:fld id="{23106D07-29B8-4C3C-B3FB-5E0D11A8336A}" type="datetimeFigureOut">
               <a:rPr lang="en-US" smtClean="0"/>
-              <a:t>5/16/2019</a:t>
+              <a:t>6/28/2019</a:t>
             </a:fld>
             <a:endParaRPr lang="en-US"/>
           </a:p>
@@ -4257,7 +4446,7 @@
           <a:p>
             <a:fld id="{23106D07-29B8-4C3C-B3FB-5E0D11A8336A}" type="datetimeFigureOut">
               <a:rPr lang="en-US" smtClean="0"/>
-              <a:t>5/16/2019</a:t>
+              <a:t>6/28/2019</a:t>
             </a:fld>
             <a:endParaRPr lang="en-US"/>
           </a:p>
@@ -4545,7 +4734,7 @@
           <a:p>
             <a:fld id="{23106D07-29B8-4C3C-B3FB-5E0D11A8336A}" type="datetimeFigureOut">
               <a:rPr lang="en-US" smtClean="0"/>
-              <a:t>5/16/2019</a:t>
+              <a:t>6/28/2019</a:t>
             </a:fld>
             <a:endParaRPr lang="en-US"/>
           </a:p>
@@ -4967,7 +5156,7 @@
           <a:p>
             <a:fld id="{23106D07-29B8-4C3C-B3FB-5E0D11A8336A}" type="datetimeFigureOut">
               <a:rPr lang="en-US" smtClean="0"/>
-              <a:t>5/16/2019</a:t>
+              <a:t>6/28/2019</a:t>
             </a:fld>
             <a:endParaRPr lang="en-US"/>
           </a:p>
@@ -5085,7 +5274,7 @@
           <a:p>
             <a:fld id="{23106D07-29B8-4C3C-B3FB-5E0D11A8336A}" type="datetimeFigureOut">
               <a:rPr lang="en-US" smtClean="0"/>
-              <a:t>5/16/2019</a:t>
+              <a:t>6/28/2019</a:t>
             </a:fld>
             <a:endParaRPr lang="en-US"/>
           </a:p>
@@ -5180,7 +5369,7 @@
           <a:p>
             <a:fld id="{23106D07-29B8-4C3C-B3FB-5E0D11A8336A}" type="datetimeFigureOut">
               <a:rPr lang="en-US" smtClean="0"/>
-              <a:t>5/16/2019</a:t>
+              <a:t>6/28/2019</a:t>
             </a:fld>
             <a:endParaRPr lang="en-US"/>
           </a:p>
@@ -5457,7 +5646,7 @@
           <a:p>
             <a:fld id="{23106D07-29B8-4C3C-B3FB-5E0D11A8336A}" type="datetimeFigureOut">
               <a:rPr lang="en-US" smtClean="0"/>
-              <a:t>5/16/2019</a:t>
+              <a:t>6/28/2019</a:t>
             </a:fld>
             <a:endParaRPr lang="en-US"/>
           </a:p>
@@ -5710,7 +5899,7 @@
           <a:p>
             <a:fld id="{23106D07-29B8-4C3C-B3FB-5E0D11A8336A}" type="datetimeFigureOut">
               <a:rPr lang="en-US" smtClean="0"/>
-              <a:t>5/16/2019</a:t>
+              <a:t>6/28/2019</a:t>
             </a:fld>
             <a:endParaRPr lang="en-US"/>
           </a:p>
@@ -5923,7 +6112,7 @@
           <a:p>
             <a:fld id="{23106D07-29B8-4C3C-B3FB-5E0D11A8336A}" type="datetimeFigureOut">
               <a:rPr lang="en-US" smtClean="0"/>
-              <a:t>5/16/2019</a:t>
+              <a:t>6/28/2019</a:t>
             </a:fld>
             <a:endParaRPr lang="en-US"/>
           </a:p>
@@ -7550,21 +7739,7 @@
                 <a:latin typeface="Arial" panose="020B0604020202020204" pitchFamily="34" charset="0"/>
                 <a:cs typeface="Arial" panose="020B0604020202020204" pitchFamily="34" charset="0"/>
               </a:rPr>
-              <a:t>  Add browns such as leaves, straw, or shredded </a:t>
-            </a:r>
-            <a:r>
-              <a:rPr lang="en-US" sz="2400" dirty="0" smtClean="0">
-                <a:latin typeface="Arial" panose="020B0604020202020204" pitchFamily="34" charset="0"/>
-                <a:cs typeface="Arial" panose="020B0604020202020204" pitchFamily="34" charset="0"/>
-              </a:rPr>
-              <a:t>cardboard/paper</a:t>
-            </a:r>
-            <a:r>
-              <a:rPr lang="en-US" sz="2400" dirty="0" smtClean="0">
-                <a:latin typeface="Arial" panose="020B0604020202020204" pitchFamily="34" charset="0"/>
-                <a:cs typeface="Arial" panose="020B0604020202020204" pitchFamily="34" charset="0"/>
-              </a:rPr>
-              <a:t>, bury food scraps, turn pile</a:t>
+              <a:t>  Add browns such as leaves, straw, or shredded cardboard/paper, bury food scraps, turn pile</a:t>
             </a:r>
           </a:p>
           <a:p>
@@ -9177,21 +9352,7 @@
                 <a:latin typeface="Arial" panose="020B0604020202020204" pitchFamily="34" charset="0"/>
                 <a:cs typeface="Arial" panose="020B0604020202020204" pitchFamily="34" charset="0"/>
               </a:rPr>
-              <a:t>Master Gardeners in our area offer how-to advice at various locations in Montgomery </a:t>
-            </a:r>
-            <a:r>
-              <a:rPr lang="en-US" sz="2000" dirty="0" smtClean="0">
-                <a:latin typeface="Arial" panose="020B0604020202020204" pitchFamily="34" charset="0"/>
-                <a:cs typeface="Arial" panose="020B0604020202020204" pitchFamily="34" charset="0"/>
-              </a:rPr>
-              <a:t>County (PA) </a:t>
-            </a:r>
-            <a:r>
-              <a:rPr lang="en-US" sz="2000" dirty="0" smtClean="0">
-                <a:latin typeface="Arial" panose="020B0604020202020204" pitchFamily="34" charset="0"/>
-                <a:cs typeface="Arial" panose="020B0604020202020204" pitchFamily="34" charset="0"/>
-              </a:rPr>
-              <a:t>from April to November. Call your local recycling program. You may qualify for a free compost bin!</a:t>
+              <a:t>Master Gardeners in our area offer how-to advice at various locations in Montgomery County (PA) from April to November. Call your local recycling program. You may qualify for a free compost bin!</a:t>
             </a:r>
             <a:br>
               <a:rPr lang="en-US" sz="2000" dirty="0" smtClean="0">
@@ -9409,11 +9570,7 @@
           <a:p>
             <a:r>
               <a:rPr lang="en-US" dirty="0" smtClean="0"/>
-              <a:t>Check nearby nurseries, libraries, B&amp;N, </a:t>
-            </a:r>
-            <a:r>
-              <a:rPr lang="en-US" dirty="0" err="1" smtClean="0"/>
-              <a:t>etc</a:t>
+              <a:t>Check nearby nurseries, libraries, B&amp;N, etc</a:t>
             </a:r>
             <a:r>
               <a:rPr lang="en-US" dirty="0"/>
@@ -9430,19 +9587,7 @@
               <a:rPr lang="en-US" dirty="0" smtClean="0">
                 <a:hlinkClick r:id="rId5"/>
               </a:rPr>
-              <a:t>Let </a:t>
-            </a:r>
-            <a:r>
-              <a:rPr lang="en-US" smtClean="0">
-                <a:hlinkClick r:id="rId5"/>
-              </a:rPr>
-              <a:t>Me Google </a:t>
-            </a:r>
-            <a:r>
-              <a:rPr lang="en-US" dirty="0" smtClean="0">
-                <a:hlinkClick r:id="rId5"/>
-              </a:rPr>
-              <a:t>That For You</a:t>
+              <a:t>Let Me Google That For You</a:t>
             </a:r>
             <a:endParaRPr lang="en-US" i="1" dirty="0" smtClean="0"/>
           </a:p>
@@ -9525,6 +9670,518 @@
     <p:extLst>
       <p:ext uri="{BB962C8B-B14F-4D97-AF65-F5344CB8AC3E}">
         <p14:creationId xmlns:p14="http://schemas.microsoft.com/office/powerpoint/2010/main" val="3798681523"/>
+      </p:ext>
+    </p:extLst>
+  </p:cSld>
+  <p:clrMapOvr>
+    <a:masterClrMapping/>
+  </p:clrMapOvr>
+  <p:timing>
+    <p:tnLst>
+      <p:par>
+        <p:cTn id="1" dur="indefinite" restart="never" nodeType="tmRoot"/>
+      </p:par>
+    </p:tnLst>
+  </p:timing>
+</p:sld>
+</file>
+
+<file path=ppt/slides/slide17.xml><?xml version="1.0" encoding="utf-8"?>
+<p:sld xmlns:a="http://schemas.openxmlformats.org/drawingml/2006/main" xmlns:r="http://schemas.openxmlformats.org/officeDocument/2006/relationships" xmlns:p="http://schemas.openxmlformats.org/presentationml/2006/main">
+  <p:cSld>
+    <p:spTree>
+      <p:nvGrpSpPr>
+        <p:cNvPr id="1" name=""/>
+        <p:cNvGrpSpPr/>
+        <p:nvPr/>
+      </p:nvGrpSpPr>
+      <p:grpSpPr>
+        <a:xfrm>
+          <a:off x="0" y="0"/>
+          <a:ext cx="0" cy="0"/>
+          <a:chOff x="0" y="0"/>
+          <a:chExt cx="0" cy="0"/>
+        </a:xfrm>
+      </p:grpSpPr>
+      <p:sp>
+        <p:nvSpPr>
+          <p:cNvPr id="2" name="Title 1"/>
+          <p:cNvSpPr>
+            <a:spLocks noGrp="1"/>
+          </p:cNvSpPr>
+          <p:nvPr>
+            <p:ph type="title"/>
+          </p:nvPr>
+        </p:nvSpPr>
+        <p:spPr>
+          <a:xfrm>
+            <a:off x="402021" y="990600"/>
+            <a:ext cx="8229600" cy="1143000"/>
+          </a:xfrm>
+        </p:spPr>
+        <p:txBody>
+          <a:bodyPr/>
+          <a:lstStyle/>
+          <a:p>
+            <a:r>
+              <a:rPr lang="en-US" b="1" dirty="0" smtClean="0"/>
+              <a:t>Shopping List</a:t>
+            </a:r>
+            <a:endParaRPr lang="en-US" b="1" dirty="0"/>
+          </a:p>
+        </p:txBody>
+      </p:sp>
+      <p:sp>
+        <p:nvSpPr>
+          <p:cNvPr id="3" name="Content Placeholder 2"/>
+          <p:cNvSpPr>
+            <a:spLocks noGrp="1"/>
+          </p:cNvSpPr>
+          <p:nvPr>
+            <p:ph idx="1"/>
+          </p:nvPr>
+        </p:nvSpPr>
+        <p:spPr>
+          <a:xfrm>
+            <a:off x="528145" y="2133600"/>
+            <a:ext cx="8229600" cy="3733800"/>
+          </a:xfrm>
+        </p:spPr>
+        <p:txBody>
+          <a:bodyPr>
+            <a:normAutofit/>
+          </a:bodyPr>
+          <a:lstStyle/>
+          <a:p>
+            <a:endParaRPr lang="en-US" i="1" dirty="0" smtClean="0"/>
+          </a:p>
+          <a:p>
+            <a:pPr marL="0" indent="0">
+              <a:buNone/>
+            </a:pPr>
+            <a:r>
+              <a:rPr lang="en-US" i="1" dirty="0" smtClean="0"/>
+              <a:t/>
+            </a:r>
+            <a:br>
+              <a:rPr lang="en-US" i="1" dirty="0" smtClean="0"/>
+            </a:br>
+            <a:endParaRPr lang="en-US" sz="1200" i="1" dirty="0" smtClean="0"/>
+          </a:p>
+          <a:p>
+            <a:endParaRPr lang="en-US" dirty="0" smtClean="0"/>
+          </a:p>
+          <a:p>
+            <a:endParaRPr lang="en-US" dirty="0"/>
+          </a:p>
+        </p:txBody>
+      </p:sp>
+      <p:pic>
+        <p:nvPicPr>
+          <p:cNvPr id="4" name="Picture 2"/>
+          <p:cNvPicPr>
+            <a:picLocks noChangeAspect="1" noChangeArrowheads="1"/>
+          </p:cNvPicPr>
+          <p:nvPr/>
+        </p:nvPicPr>
+        <p:blipFill>
+          <a:blip r:embed="rId3">
+            <a:extLst>
+              <a:ext uri="{28A0092B-C50C-407E-A947-70E740481C1C}">
+                <a14:useLocalDpi xmlns:a14="http://schemas.microsoft.com/office/drawing/2010/main" val="0"/>
+              </a:ext>
+            </a:extLst>
+          </a:blip>
+          <a:srcRect/>
+          <a:stretch>
+            <a:fillRect/>
+          </a:stretch>
+        </p:blipFill>
+        <p:spPr bwMode="auto">
+          <a:xfrm>
+            <a:off x="147145" y="228600"/>
+            <a:ext cx="8991600" cy="1038225"/>
+          </a:xfrm>
+          <a:prstGeom prst="rect">
+            <a:avLst/>
+          </a:prstGeom>
+          <a:noFill/>
+          <a:ln>
+            <a:noFill/>
+          </a:ln>
+          <a:extLst>
+            <a:ext uri="{909E8E84-426E-40DD-AFC4-6F175D3DCCD1}">
+              <a14:hiddenFill xmlns:a14="http://schemas.microsoft.com/office/drawing/2010/main">
+                <a:solidFill>
+                  <a:schemeClr val="accent1"/>
+                </a:solidFill>
+              </a14:hiddenFill>
+            </a:ext>
+            <a:ext uri="{91240B29-F687-4F45-9708-019B960494DF}">
+              <a14:hiddenLine xmlns:a14="http://schemas.microsoft.com/office/drawing/2010/main" w="9525">
+                <a:solidFill>
+                  <a:schemeClr val="tx1"/>
+                </a:solidFill>
+                <a:miter lim="800000"/>
+                <a:headEnd/>
+                <a:tailEnd/>
+              </a14:hiddenLine>
+            </a:ext>
+          </a:extLst>
+        </p:spPr>
+      </p:pic>
+      <p:pic>
+        <p:nvPicPr>
+          <p:cNvPr id="1027" name="Picture 3"/>
+          <p:cNvPicPr>
+            <a:picLocks noChangeAspect="1" noChangeArrowheads="1"/>
+          </p:cNvPicPr>
+          <p:nvPr/>
+        </p:nvPicPr>
+        <p:blipFill>
+          <a:blip r:embed="rId4" cstate="print">
+            <a:extLst>
+              <a:ext uri="{28A0092B-C50C-407E-A947-70E740481C1C}">
+                <a14:useLocalDpi xmlns:a14="http://schemas.microsoft.com/office/drawing/2010/main" val="0"/>
+              </a:ext>
+            </a:extLst>
+          </a:blip>
+          <a:srcRect/>
+          <a:stretch>
+            <a:fillRect/>
+          </a:stretch>
+        </p:blipFill>
+        <p:spPr bwMode="auto">
+          <a:xfrm>
+            <a:off x="99060" y="1885829"/>
+            <a:ext cx="2743200" cy="1771771"/>
+          </a:xfrm>
+          <a:prstGeom prst="rect">
+            <a:avLst/>
+          </a:prstGeom>
+          <a:noFill/>
+          <a:ln>
+            <a:noFill/>
+          </a:ln>
+          <a:effectLst/>
+          <a:extLst>
+            <a:ext uri="{909E8E84-426E-40DD-AFC4-6F175D3DCCD1}">
+              <a14:hiddenFill xmlns:a14="http://schemas.microsoft.com/office/drawing/2010/main">
+                <a:solidFill>
+                  <a:schemeClr val="accent1"/>
+                </a:solidFill>
+              </a14:hiddenFill>
+            </a:ext>
+            <a:ext uri="{91240B29-F687-4F45-9708-019B960494DF}">
+              <a14:hiddenLine xmlns:a14="http://schemas.microsoft.com/office/drawing/2010/main" w="9525">
+                <a:solidFill>
+                  <a:schemeClr val="tx1"/>
+                </a:solidFill>
+                <a:miter lim="800000"/>
+                <a:headEnd/>
+                <a:tailEnd/>
+              </a14:hiddenLine>
+            </a:ext>
+            <a:ext uri="{AF507438-7753-43E0-B8FC-AC1667EBCBE1}">
+              <a14:hiddenEffects xmlns:a14="http://schemas.microsoft.com/office/drawing/2010/main">
+                <a:effectLst>
+                  <a:outerShdw dist="35921" dir="2700000" algn="ctr" rotWithShape="0">
+                    <a:schemeClr val="bg2"/>
+                  </a:outerShdw>
+                </a:effectLst>
+              </a14:hiddenEffects>
+            </a:ext>
+          </a:extLst>
+        </p:spPr>
+      </p:pic>
+      <p:sp>
+        <p:nvSpPr>
+          <p:cNvPr id="5" name="Rectangle 4"/>
+          <p:cNvSpPr/>
+          <p:nvPr/>
+        </p:nvSpPr>
+        <p:spPr>
+          <a:xfrm>
+            <a:off x="22860" y="3472936"/>
+            <a:ext cx="4572000" cy="369332"/>
+          </a:xfrm>
+          <a:prstGeom prst="rect">
+            <a:avLst/>
+          </a:prstGeom>
+        </p:spPr>
+        <p:txBody>
+          <a:bodyPr>
+            <a:spAutoFit/>
+          </a:bodyPr>
+          <a:lstStyle/>
+          <a:p>
+            <a:r>
+              <a:rPr lang="en-US" dirty="0" err="1" smtClean="0"/>
+              <a:t>Bokashi</a:t>
+            </a:r>
+            <a:r>
+              <a:rPr lang="en-US" dirty="0" smtClean="0"/>
+              <a:t> </a:t>
+            </a:r>
+            <a:r>
+              <a:rPr lang="en-US" dirty="0"/>
+              <a:t>Composting Starter </a:t>
+            </a:r>
+            <a:r>
+              <a:rPr lang="en-US" dirty="0" smtClean="0"/>
+              <a:t>Kit (</a:t>
+            </a:r>
+            <a:r>
+              <a:rPr lang="en-US" dirty="0" smtClean="0">
+                <a:hlinkClick r:id="rId5"/>
+              </a:rPr>
+              <a:t>amazon.com</a:t>
+            </a:r>
+            <a:r>
+              <a:rPr lang="en-US" dirty="0" smtClean="0"/>
+              <a:t>)</a:t>
+            </a:r>
+            <a:endParaRPr lang="en-US" dirty="0"/>
+          </a:p>
+        </p:txBody>
+      </p:sp>
+      <p:pic>
+        <p:nvPicPr>
+          <p:cNvPr id="1028" name="Picture 4"/>
+          <p:cNvPicPr>
+            <a:picLocks noChangeAspect="1" noChangeArrowheads="1"/>
+          </p:cNvPicPr>
+          <p:nvPr/>
+        </p:nvPicPr>
+        <p:blipFill>
+          <a:blip r:embed="rId6" cstate="print">
+            <a:extLst>
+              <a:ext uri="{28A0092B-C50C-407E-A947-70E740481C1C}">
+                <a14:useLocalDpi xmlns:a14="http://schemas.microsoft.com/office/drawing/2010/main" val="0"/>
+              </a:ext>
+            </a:extLst>
+          </a:blip>
+          <a:srcRect/>
+          <a:stretch>
+            <a:fillRect/>
+          </a:stretch>
+        </p:blipFill>
+        <p:spPr bwMode="auto">
+          <a:xfrm>
+            <a:off x="280862" y="3886200"/>
+            <a:ext cx="1577976" cy="1729740"/>
+          </a:xfrm>
+          <a:prstGeom prst="rect">
+            <a:avLst/>
+          </a:prstGeom>
+          <a:noFill/>
+          <a:ln>
+            <a:noFill/>
+          </a:ln>
+          <a:effectLst/>
+          <a:extLst>
+            <a:ext uri="{909E8E84-426E-40DD-AFC4-6F175D3DCCD1}">
+              <a14:hiddenFill xmlns:a14="http://schemas.microsoft.com/office/drawing/2010/main">
+                <a:solidFill>
+                  <a:schemeClr val="accent1"/>
+                </a:solidFill>
+              </a14:hiddenFill>
+            </a:ext>
+            <a:ext uri="{91240B29-F687-4F45-9708-019B960494DF}">
+              <a14:hiddenLine xmlns:a14="http://schemas.microsoft.com/office/drawing/2010/main" w="9525">
+                <a:solidFill>
+                  <a:schemeClr val="tx1"/>
+                </a:solidFill>
+                <a:miter lim="800000"/>
+                <a:headEnd/>
+                <a:tailEnd/>
+              </a14:hiddenLine>
+            </a:ext>
+            <a:ext uri="{AF507438-7753-43E0-B8FC-AC1667EBCBE1}">
+              <a14:hiddenEffects xmlns:a14="http://schemas.microsoft.com/office/drawing/2010/main">
+                <a:effectLst>
+                  <a:outerShdw dist="35921" dir="2700000" algn="ctr" rotWithShape="0">
+                    <a:schemeClr val="bg2"/>
+                  </a:outerShdw>
+                </a:effectLst>
+              </a14:hiddenEffects>
+            </a:ext>
+          </a:extLst>
+        </p:spPr>
+      </p:pic>
+      <p:sp>
+        <p:nvSpPr>
+          <p:cNvPr id="6" name="Rectangle 5"/>
+          <p:cNvSpPr/>
+          <p:nvPr/>
+        </p:nvSpPr>
+        <p:spPr>
+          <a:xfrm>
+            <a:off x="99060" y="5638800"/>
+            <a:ext cx="4572000" cy="646331"/>
+          </a:xfrm>
+          <a:prstGeom prst="rect">
+            <a:avLst/>
+          </a:prstGeom>
+        </p:spPr>
+        <p:txBody>
+          <a:bodyPr>
+            <a:spAutoFit/>
+          </a:bodyPr>
+          <a:lstStyle/>
+          <a:p>
+            <a:r>
+              <a:rPr lang="en-US" dirty="0" err="1" smtClean="0"/>
+              <a:t>Vremi</a:t>
+            </a:r>
+            <a:r>
+              <a:rPr lang="en-US" dirty="0" smtClean="0"/>
+              <a:t> </a:t>
+            </a:r>
+            <a:r>
+              <a:rPr lang="en-US" dirty="0"/>
+              <a:t>Kitchen Compost Bin for Counter or Under Sink - 1.2 </a:t>
+            </a:r>
+            <a:r>
+              <a:rPr lang="en-US" dirty="0" smtClean="0"/>
+              <a:t>Gallon (</a:t>
+            </a:r>
+            <a:r>
+              <a:rPr lang="en-US" dirty="0" smtClean="0">
+                <a:hlinkClick r:id="rId7"/>
+              </a:rPr>
+              <a:t>amazon.com</a:t>
+            </a:r>
+            <a:r>
+              <a:rPr lang="en-US" dirty="0" smtClean="0"/>
+              <a:t>)</a:t>
+            </a:r>
+            <a:endParaRPr lang="en-US" dirty="0"/>
+          </a:p>
+        </p:txBody>
+      </p:sp>
+      <p:pic>
+        <p:nvPicPr>
+          <p:cNvPr id="1029" name="Picture 5"/>
+          <p:cNvPicPr>
+            <a:picLocks noChangeAspect="1" noChangeArrowheads="1"/>
+          </p:cNvPicPr>
+          <p:nvPr/>
+        </p:nvPicPr>
+        <p:blipFill>
+          <a:blip r:embed="rId8" cstate="print">
+            <a:extLst>
+              <a:ext uri="{28A0092B-C50C-407E-A947-70E740481C1C}">
+                <a14:useLocalDpi xmlns:a14="http://schemas.microsoft.com/office/drawing/2010/main" val="0"/>
+              </a:ext>
+            </a:extLst>
+          </a:blip>
+          <a:srcRect/>
+          <a:stretch>
+            <a:fillRect/>
+          </a:stretch>
+        </p:blipFill>
+        <p:spPr bwMode="auto">
+          <a:xfrm>
+            <a:off x="5029200" y="2057400"/>
+            <a:ext cx="2286000" cy="2455192"/>
+          </a:xfrm>
+          <a:prstGeom prst="rect">
+            <a:avLst/>
+          </a:prstGeom>
+          <a:noFill/>
+          <a:ln>
+            <a:noFill/>
+          </a:ln>
+          <a:effectLst/>
+          <a:extLst>
+            <a:ext uri="{909E8E84-426E-40DD-AFC4-6F175D3DCCD1}">
+              <a14:hiddenFill xmlns:a14="http://schemas.microsoft.com/office/drawing/2010/main">
+                <a:solidFill>
+                  <a:schemeClr val="accent1"/>
+                </a:solidFill>
+              </a14:hiddenFill>
+            </a:ext>
+            <a:ext uri="{91240B29-F687-4F45-9708-019B960494DF}">
+              <a14:hiddenLine xmlns:a14="http://schemas.microsoft.com/office/drawing/2010/main" w="9525">
+                <a:solidFill>
+                  <a:schemeClr val="tx1"/>
+                </a:solidFill>
+                <a:miter lim="800000"/>
+                <a:headEnd/>
+                <a:tailEnd/>
+              </a14:hiddenLine>
+            </a:ext>
+            <a:ext uri="{AF507438-7753-43E0-B8FC-AC1667EBCBE1}">
+              <a14:hiddenEffects xmlns:a14="http://schemas.microsoft.com/office/drawing/2010/main">
+                <a:effectLst>
+                  <a:outerShdw dist="35921" dir="2700000" algn="ctr" rotWithShape="0">
+                    <a:schemeClr val="bg2"/>
+                  </a:outerShdw>
+                </a:effectLst>
+              </a14:hiddenEffects>
+            </a:ext>
+          </a:extLst>
+        </p:spPr>
+      </p:pic>
+      <p:sp>
+        <p:nvSpPr>
+          <p:cNvPr id="7" name="Rectangle 6"/>
+          <p:cNvSpPr/>
+          <p:nvPr/>
+        </p:nvSpPr>
+        <p:spPr>
+          <a:xfrm>
+            <a:off x="5029200" y="4512592"/>
+            <a:ext cx="3733800" cy="646331"/>
+          </a:xfrm>
+          <a:prstGeom prst="rect">
+            <a:avLst/>
+          </a:prstGeom>
+        </p:spPr>
+        <p:txBody>
+          <a:bodyPr wrap="square">
+            <a:spAutoFit/>
+          </a:bodyPr>
+          <a:lstStyle/>
+          <a:p>
+            <a:r>
+              <a:rPr lang="en-US" dirty="0" smtClean="0"/>
+              <a:t>Worm </a:t>
+            </a:r>
+            <a:r>
+              <a:rPr lang="en-US" dirty="0"/>
+              <a:t>Factory 360 WF360B </a:t>
+            </a:r>
+            <a:r>
+              <a:rPr lang="en-US" dirty="0" smtClean="0"/>
+              <a:t/>
+            </a:r>
+            <a:br>
+              <a:rPr lang="en-US" dirty="0" smtClean="0"/>
+            </a:br>
+            <a:r>
+              <a:rPr lang="en-US" dirty="0" smtClean="0"/>
+              <a:t>Worm Composter (</a:t>
+            </a:r>
+            <a:r>
+              <a:rPr lang="en-US" dirty="0" smtClean="0">
+                <a:hlinkClick r:id="rId9"/>
+              </a:rPr>
+              <a:t>amazon.com</a:t>
+            </a:r>
+            <a:r>
+              <a:rPr lang="en-US" dirty="0" smtClean="0"/>
+              <a:t>)</a:t>
+            </a:r>
+            <a:endParaRPr lang="en-US" dirty="0"/>
+          </a:p>
+        </p:txBody>
+      </p:sp>
+    </p:spTree>
+    <p:extLst>
+      <p:ext uri="{BB962C8B-B14F-4D97-AF65-F5344CB8AC3E}">
+        <p14:creationId xmlns:p14="http://schemas.microsoft.com/office/powerpoint/2010/main" val="2686971160"/>
       </p:ext>
     </p:extLst>
   </p:cSld>
@@ -10008,70 +10665,6 @@
           </a:p>
         </p:txBody>
       </p:sp>
-      <p:pic>
-        <p:nvPicPr>
-          <p:cNvPr id="1031" name="Picture 7"/>
-          <p:cNvPicPr>
-            <a:picLocks noChangeAspect="1" noChangeArrowheads="1"/>
-          </p:cNvPicPr>
-          <p:nvPr/>
-        </p:nvPicPr>
-        <p:blipFill>
-          <a:blip r:embed="rId4">
-            <a:extLst>
-              <a:ext uri="{28A0092B-C50C-407E-A947-70E740481C1C}">
-                <a14:useLocalDpi xmlns:a14="http://schemas.microsoft.com/office/drawing/2010/main" val="0"/>
-              </a:ext>
-            </a:extLst>
-          </a:blip>
-          <a:srcRect/>
-          <a:stretch>
-            <a:fillRect/>
-          </a:stretch>
-        </p:blipFill>
-        <p:spPr bwMode="auto">
-          <a:xfrm>
-            <a:off x="5486400" y="2777766"/>
-            <a:ext cx="2895600" cy="3915452"/>
-          </a:xfrm>
-          <a:prstGeom prst="rect">
-            <a:avLst/>
-          </a:prstGeom>
-          <a:noFill/>
-          <a:ln>
-            <a:noFill/>
-          </a:ln>
-          <a:effectLst/>
-          <a:extLst>
-            <a:ext uri="{909E8E84-426E-40DD-AFC4-6F175D3DCCD1}">
-              <a14:hiddenFill xmlns:a14="http://schemas.microsoft.com/office/drawing/2010/main">
-                <a:solidFill>
-                  <a:schemeClr val="accent1"/>
-                </a:solidFill>
-              </a14:hiddenFill>
-            </a:ext>
-            <a:ext uri="{91240B29-F687-4F45-9708-019B960494DF}">
-              <a14:hiddenLine xmlns:a14="http://schemas.microsoft.com/office/drawing/2010/main" w="9525">
-                <a:solidFill>
-                  <a:schemeClr val="tx1"/>
-                </a:solidFill>
-                <a:miter lim="800000"/>
-                <a:headEnd/>
-                <a:tailEnd/>
-              </a14:hiddenLine>
-            </a:ext>
-            <a:ext uri="{AF507438-7753-43E0-B8FC-AC1667EBCBE1}">
-              <a14:hiddenEffects xmlns:a14="http://schemas.microsoft.com/office/drawing/2010/main">
-                <a:effectLst>
-                  <a:outerShdw dist="35921" dir="2700000" algn="ctr" rotWithShape="0">
-                    <a:schemeClr val="bg2"/>
-                  </a:outerShdw>
-                </a:effectLst>
-              </a14:hiddenEffects>
-            </a:ext>
-          </a:extLst>
-        </p:spPr>
-      </p:pic>
     </p:spTree>
     <p:extLst>
       <p:ext uri="{BB962C8B-B14F-4D97-AF65-F5344CB8AC3E}">
@@ -10696,7 +11289,11 @@
           <a:p>
             <a:r>
               <a:rPr lang="en-US" b="1" dirty="0" smtClean="0"/>
-              <a:t>What goes in your Compost</a:t>
+              <a:t>What goes in your </a:t>
+            </a:r>
+            <a:r>
+              <a:rPr lang="en-US" b="1" dirty="0" smtClean="0"/>
+              <a:t>Compost?</a:t>
             </a:r>
             <a:endParaRPr lang="en-US" b="1" dirty="0"/>
           </a:p>
@@ -10721,14 +11318,14 @@
               <a:buNone/>
             </a:pPr>
             <a:r>
-              <a:rPr lang="en-US" dirty="0" smtClean="0"/>
+              <a:rPr lang="en-US" sz="2400" dirty="0" smtClean="0"/>
               <a:t>Carbon: dried leaves, </a:t>
             </a:r>
             <a:br>
-              <a:rPr lang="en-US" dirty="0" smtClean="0"/>
+              <a:rPr lang="en-US" sz="2400" dirty="0" smtClean="0"/>
             </a:br>
             <a:r>
-              <a:rPr lang="en-US" dirty="0" smtClean="0"/>
+              <a:rPr lang="en-US" sz="2400" dirty="0" smtClean="0"/>
               <a:t>cardboard, paper, pulp, straw</a:t>
             </a:r>
           </a:p>
@@ -10737,7 +11334,7 @@
               <a:buNone/>
             </a:pPr>
             <a:r>
-              <a:rPr lang="en-US" dirty="0" smtClean="0"/>
+              <a:rPr lang="en-US" sz="2400" dirty="0" smtClean="0"/>
               <a:t>Nitrogen:  food scraps, plants</a:t>
             </a:r>
           </a:p>
@@ -10746,7 +11343,7 @@
               <a:buNone/>
             </a:pPr>
             <a:r>
-              <a:rPr lang="en-US" dirty="0" smtClean="0"/>
+              <a:rPr lang="en-US" sz="2400" dirty="0" smtClean="0"/>
               <a:t>Water/Moisture </a:t>
             </a:r>
           </a:p>
@@ -10755,7 +11352,7 @@
               <a:buNone/>
             </a:pPr>
             <a:r>
-              <a:rPr lang="en-US" dirty="0" smtClean="0"/>
+              <a:rPr lang="en-US" sz="2400" dirty="0" smtClean="0"/>
               <a:t>Oxygen </a:t>
             </a:r>
           </a:p>
@@ -10795,7 +11392,7 @@
         </p:blipFill>
         <p:spPr>
           <a:xfrm>
-            <a:off x="5558672" y="1295399"/>
+            <a:off x="4724400" y="1524000"/>
             <a:ext cx="3051929" cy="2286001"/>
           </a:xfrm>
           <a:prstGeom prst="rect">
@@ -10805,7 +11402,7 @@
       </p:pic>
       <p:pic>
         <p:nvPicPr>
-          <p:cNvPr id="7" name="Picture 6"/>
+          <p:cNvPr id="4" name="Picture 3"/>
           <p:cNvPicPr>
             <a:picLocks noChangeAspect="1"/>
           </p:cNvPicPr>
@@ -10825,8 +11422,8 @@
         </p:blipFill>
         <p:spPr>
           <a:xfrm>
-            <a:off x="6096000" y="3766479"/>
-            <a:ext cx="2057400" cy="2746735"/>
+            <a:off x="533400" y="3886200"/>
+            <a:ext cx="2923649" cy="2189914"/>
           </a:xfrm>
           <a:prstGeom prst="rect">
             <a:avLst/>
@@ -10835,7 +11432,7 @@
       </p:pic>
       <p:pic>
         <p:nvPicPr>
-          <p:cNvPr id="4" name="Picture 3"/>
+          <p:cNvPr id="8" name="Picture 7"/>
           <p:cNvPicPr>
             <a:picLocks noChangeAspect="1"/>
           </p:cNvPicPr>
@@ -10855,8 +11452,8 @@
         </p:blipFill>
         <p:spPr>
           <a:xfrm>
-            <a:off x="2645532" y="3906086"/>
-            <a:ext cx="2923649" cy="2189914"/>
+            <a:off x="3352800" y="3528061"/>
+            <a:ext cx="4622170" cy="3066631"/>
           </a:xfrm>
           <a:prstGeom prst="rect">
             <a:avLst/>
@@ -10960,7 +11557,7 @@
                                           </p:stCondLst>
                                         </p:cTn>
                                         <p:tgtEl>
-                                          <p:spTgt spid="7"/>
+                                          <p:spTgt spid="4"/>
                                         </p:tgtEl>
                                         <p:attrNameLst>
                                           <p:attrName>style.visibility</p:attrName>
@@ -10974,7 +11571,7 @@
                                       <p:cBhvr>
                                         <p:cTn id="12" dur="500"/>
                                         <p:tgtEl>
-                                          <p:spTgt spid="7"/>
+                                          <p:spTgt spid="4"/>
                                         </p:tgtEl>
                                       </p:cBhvr>
                                     </p:animEffect>
@@ -11013,59 +11610,6 @@
                                           </p:stCondLst>
                                         </p:cTn>
                                         <p:tgtEl>
-                                          <p:spTgt spid="4"/>
-                                        </p:tgtEl>
-                                        <p:attrNameLst>
-                                          <p:attrName>style.visibility</p:attrName>
-                                        </p:attrNameLst>
-                                      </p:cBhvr>
-                                      <p:to>
-                                        <p:strVal val="visible"/>
-                                      </p:to>
-                                    </p:set>
-                                    <p:animEffect transition="in" filter="fade">
-                                      <p:cBhvr>
-                                        <p:cTn id="17" dur="500"/>
-                                        <p:tgtEl>
-                                          <p:spTgt spid="4"/>
-                                        </p:tgtEl>
-                                      </p:cBhvr>
-                                    </p:animEffect>
-                                  </p:childTnLst>
-                                </p:cTn>
-                              </p:par>
-                            </p:childTnLst>
-                          </p:cTn>
-                        </p:par>
-                      </p:childTnLst>
-                    </p:cTn>
-                  </p:par>
-                  <p:par>
-                    <p:cTn id="18" fill="hold">
-                      <p:stCondLst>
-                        <p:cond delay="indefinite"/>
-                      </p:stCondLst>
-                      <p:childTnLst>
-                        <p:par>
-                          <p:cTn id="19" fill="hold">
-                            <p:stCondLst>
-                              <p:cond delay="0"/>
-                            </p:stCondLst>
-                            <p:childTnLst>
-                              <p:par>
-                                <p:cTn id="20" presetID="10" presetClass="entr" presetSubtype="0" fill="hold" nodeType="clickEffect">
-                                  <p:stCondLst>
-                                    <p:cond delay="0"/>
-                                  </p:stCondLst>
-                                  <p:childTnLst>
-                                    <p:set>
-                                      <p:cBhvr>
-                                        <p:cTn id="21" dur="1" fill="hold">
-                                          <p:stCondLst>
-                                            <p:cond delay="0"/>
-                                          </p:stCondLst>
-                                        </p:cTn>
-                                        <p:tgtEl>
                                           <p:spTgt spid="3">
                                             <p:txEl>
                                               <p:pRg st="0" end="0"/>
@@ -11082,7 +11626,7 @@
                                     </p:set>
                                     <p:animEffect transition="in" filter="fade">
                                       <p:cBhvr>
-                                        <p:cTn id="22" dur="500"/>
+                                        <p:cTn id="17" dur="500"/>
                                         <p:tgtEl>
                                           <p:spTgt spid="3">
                                             <p:txEl>
@@ -11096,14 +11640,14 @@
                                 </p:cTn>
                               </p:par>
                               <p:par>
-                                <p:cTn id="23" presetID="10" presetClass="entr" presetSubtype="0" fill="hold" nodeType="withEffect">
+                                <p:cTn id="18" presetID="10" presetClass="entr" presetSubtype="0" fill="hold" nodeType="withEffect">
                                   <p:stCondLst>
                                     <p:cond delay="0"/>
                                   </p:stCondLst>
                                   <p:childTnLst>
                                     <p:set>
                                       <p:cBhvr>
-                                        <p:cTn id="24" dur="1" fill="hold">
+                                        <p:cTn id="19" dur="1" fill="hold">
                                           <p:stCondLst>
                                             <p:cond delay="0"/>
                                           </p:stCondLst>
@@ -11125,7 +11669,7 @@
                                     </p:set>
                                     <p:animEffect transition="in" filter="fade">
                                       <p:cBhvr>
-                                        <p:cTn id="25" dur="500"/>
+                                        <p:cTn id="20" dur="500"/>
                                         <p:tgtEl>
                                           <p:spTgt spid="3">
                                             <p:txEl>
@@ -11139,14 +11683,14 @@
                                 </p:cTn>
                               </p:par>
                               <p:par>
-                                <p:cTn id="26" presetID="10" presetClass="entr" presetSubtype="0" fill="hold" nodeType="withEffect">
+                                <p:cTn id="21" presetID="10" presetClass="entr" presetSubtype="0" fill="hold" nodeType="withEffect">
                                   <p:stCondLst>
                                     <p:cond delay="0"/>
                                   </p:stCondLst>
                                   <p:childTnLst>
                                     <p:set>
                                       <p:cBhvr>
-                                        <p:cTn id="27" dur="1" fill="hold">
+                                        <p:cTn id="22" dur="1" fill="hold">
                                           <p:stCondLst>
                                             <p:cond delay="0"/>
                                           </p:stCondLst>
@@ -11168,7 +11712,7 @@
                                     </p:set>
                                     <p:animEffect transition="in" filter="fade">
                                       <p:cBhvr>
-                                        <p:cTn id="28" dur="500"/>
+                                        <p:cTn id="23" dur="500"/>
                                         <p:tgtEl>
                                           <p:spTgt spid="3">
                                             <p:txEl>
@@ -11182,14 +11726,14 @@
                                 </p:cTn>
                               </p:par>
                               <p:par>
-                                <p:cTn id="29" presetID="10" presetClass="entr" presetSubtype="0" fill="hold" nodeType="withEffect">
+                                <p:cTn id="24" presetID="10" presetClass="entr" presetSubtype="0" fill="hold" nodeType="withEffect">
                                   <p:stCondLst>
                                     <p:cond delay="0"/>
                                   </p:stCondLst>
                                   <p:childTnLst>
                                     <p:set>
                                       <p:cBhvr>
-                                        <p:cTn id="30" dur="1" fill="hold">
+                                        <p:cTn id="25" dur="1" fill="hold">
                                           <p:stCondLst>
                                             <p:cond delay="0"/>
                                           </p:stCondLst>
@@ -11211,7 +11755,7 @@
                                     </p:set>
                                     <p:animEffect transition="in" filter="fade">
                                       <p:cBhvr>
-                                        <p:cTn id="31" dur="500"/>
+                                        <p:cTn id="26" dur="500"/>
                                         <p:tgtEl>
                                           <p:spTgt spid="3">
                                             <p:txEl>
@@ -11274,280 +11818,6 @@
       </p:grpSpPr>
       <p:sp>
         <p:nvSpPr>
-          <p:cNvPr id="2" name="Title 1"/>
-          <p:cNvSpPr>
-            <a:spLocks noGrp="1"/>
-          </p:cNvSpPr>
-          <p:nvPr>
-            <p:ph type="title"/>
-          </p:nvPr>
-        </p:nvSpPr>
-        <p:spPr>
-          <a:xfrm>
-            <a:off x="2895600" y="76200"/>
-            <a:ext cx="2286000" cy="990600"/>
-          </a:xfrm>
-        </p:spPr>
-        <p:txBody>
-          <a:bodyPr>
-            <a:normAutofit/>
-          </a:bodyPr>
-          <a:lstStyle/>
-          <a:p>
-            <a:pPr algn="l"/>
-            <a:r>
-              <a:rPr lang="en-US" dirty="0" smtClean="0"/>
-              <a:t>   Ratios</a:t>
-            </a:r>
-            <a:endParaRPr lang="en-US" dirty="0"/>
-          </a:p>
-        </p:txBody>
-      </p:sp>
-      <p:sp>
-        <p:nvSpPr>
-          <p:cNvPr id="3" name="Content Placeholder 2"/>
-          <p:cNvSpPr>
-            <a:spLocks noGrp="1"/>
-          </p:cNvSpPr>
-          <p:nvPr>
-            <p:ph idx="1"/>
-          </p:nvPr>
-        </p:nvSpPr>
-        <p:spPr>
-          <a:xfrm>
-            <a:off x="914400" y="1600520"/>
-            <a:ext cx="8229600" cy="4525963"/>
-          </a:xfrm>
-        </p:spPr>
-        <p:txBody>
-          <a:bodyPr/>
-          <a:lstStyle/>
-          <a:p>
-            <a:pPr marL="0" indent="0">
-              <a:buNone/>
-            </a:pPr>
-            <a:r>
-              <a:rPr lang="en-US" sz="5400" b="1" dirty="0" smtClean="0">
-                <a:solidFill>
-                  <a:schemeClr val="accent6">
-                    <a:lumMod val="50000"/>
-                  </a:schemeClr>
-                </a:solidFill>
-              </a:rPr>
-              <a:t>BROWNS</a:t>
-            </a:r>
-            <a:r>
-              <a:rPr lang="en-US" dirty="0" smtClean="0"/>
-              <a:t>		</a:t>
-            </a:r>
-            <a:r>
-              <a:rPr lang="en-US" sz="5400" b="1" dirty="0" smtClean="0">
-                <a:solidFill>
-                  <a:schemeClr val="accent3">
-                    <a:lumMod val="75000"/>
-                  </a:schemeClr>
-                </a:solidFill>
-              </a:rPr>
-              <a:t>GREENS</a:t>
-            </a:r>
-            <a:endParaRPr lang="en-US" sz="5400" b="1" dirty="0">
-              <a:solidFill>
-                <a:schemeClr val="accent3">
-                  <a:lumMod val="75000"/>
-                </a:schemeClr>
-              </a:solidFill>
-            </a:endParaRPr>
-          </a:p>
-          <a:p>
-            <a:pPr marL="0" indent="0">
-              <a:lnSpc>
-                <a:spcPts val="2700"/>
-              </a:lnSpc>
-              <a:spcBef>
-                <a:spcPts val="600"/>
-              </a:spcBef>
-              <a:buNone/>
-            </a:pPr>
-            <a:r>
-              <a:rPr lang="en-US" dirty="0" smtClean="0"/>
-              <a:t>Dried leaves		Kitchen scraps</a:t>
-            </a:r>
-          </a:p>
-          <a:p>
-            <a:pPr marL="0" indent="0">
-              <a:lnSpc>
-                <a:spcPts val="2700"/>
-              </a:lnSpc>
-              <a:spcBef>
-                <a:spcPts val="600"/>
-              </a:spcBef>
-              <a:buNone/>
-            </a:pPr>
-            <a:r>
-              <a:rPr lang="en-US" dirty="0" smtClean="0"/>
-              <a:t>Straw			Coffee grounds &amp; filter</a:t>
-            </a:r>
-          </a:p>
-          <a:p>
-            <a:pPr marL="0" indent="0">
-              <a:lnSpc>
-                <a:spcPts val="2700"/>
-              </a:lnSpc>
-              <a:spcBef>
-                <a:spcPts val="600"/>
-              </a:spcBef>
-              <a:buNone/>
-            </a:pPr>
-            <a:r>
-              <a:rPr lang="en-US" dirty="0" smtClean="0"/>
-              <a:t>Shredded paper		Tea bags	</a:t>
-            </a:r>
-          </a:p>
-          <a:p>
-            <a:pPr marL="0" indent="0">
-              <a:lnSpc>
-                <a:spcPts val="2700"/>
-              </a:lnSpc>
-              <a:spcBef>
-                <a:spcPts val="600"/>
-              </a:spcBef>
-              <a:buNone/>
-            </a:pPr>
-            <a:r>
-              <a:rPr lang="en-US" dirty="0" smtClean="0"/>
-              <a:t>Drier lint			Yard clippings</a:t>
-            </a:r>
-          </a:p>
-          <a:p>
-            <a:pPr marL="0" indent="0">
-              <a:lnSpc>
-                <a:spcPts val="2700"/>
-              </a:lnSpc>
-              <a:spcBef>
-                <a:spcPts val="600"/>
-              </a:spcBef>
-              <a:buNone/>
-            </a:pPr>
-            <a:r>
-              <a:rPr lang="en-US" dirty="0" smtClean="0"/>
-              <a:t>Newspaper		Pet hair</a:t>
-            </a:r>
-          </a:p>
-          <a:p>
-            <a:pPr marL="0" indent="0">
-              <a:lnSpc>
-                <a:spcPts val="2700"/>
-              </a:lnSpc>
-              <a:spcBef>
-                <a:spcPts val="600"/>
-              </a:spcBef>
-              <a:buNone/>
-            </a:pPr>
-            <a:r>
-              <a:rPr lang="en-US" dirty="0" smtClean="0"/>
-              <a:t>Pine needles		Manure (from</a:t>
-            </a:r>
-          </a:p>
-          <a:p>
-            <a:pPr marL="0" indent="0">
-              <a:lnSpc>
-                <a:spcPts val="2700"/>
-              </a:lnSpc>
-              <a:spcBef>
-                <a:spcPts val="600"/>
-              </a:spcBef>
-              <a:buNone/>
-            </a:pPr>
-            <a:r>
-              <a:rPr lang="en-US" dirty="0" smtClean="0"/>
-              <a:t>Sawdust			     herbivores*)</a:t>
-            </a:r>
-          </a:p>
-          <a:p>
-            <a:pPr marL="0" indent="0">
-              <a:buNone/>
-            </a:pPr>
-            <a:r>
-              <a:rPr lang="en-US" dirty="0" smtClean="0"/>
-              <a:t>Paper bags</a:t>
-            </a:r>
-          </a:p>
-          <a:p>
-            <a:pPr marL="0" indent="0">
-              <a:buNone/>
-            </a:pPr>
-            <a:endParaRPr lang="en-US" dirty="0" smtClean="0"/>
-          </a:p>
-          <a:p>
-            <a:pPr marL="0" indent="0">
-              <a:buNone/>
-            </a:pPr>
-            <a:endParaRPr lang="en-US" dirty="0" smtClean="0"/>
-          </a:p>
-          <a:p>
-            <a:endParaRPr lang="en-US" dirty="0" smtClean="0"/>
-          </a:p>
-          <a:p>
-            <a:endParaRPr lang="en-US" dirty="0"/>
-          </a:p>
-        </p:txBody>
-      </p:sp>
-      <p:pic>
-        <p:nvPicPr>
-          <p:cNvPr id="4" name="Picture 2"/>
-          <p:cNvPicPr>
-            <a:picLocks noChangeAspect="1" noChangeArrowheads="1"/>
-          </p:cNvPicPr>
-          <p:nvPr/>
-        </p:nvPicPr>
-        <p:blipFill>
-          <a:blip r:embed="rId3">
-            <a:extLst>
-              <a:ext uri="{28A0092B-C50C-407E-A947-70E740481C1C}">
-                <a14:useLocalDpi xmlns:a14="http://schemas.microsoft.com/office/drawing/2010/main" val="0"/>
-              </a:ext>
-            </a:extLst>
-          </a:blip>
-          <a:srcRect/>
-          <a:stretch>
-            <a:fillRect/>
-          </a:stretch>
-        </p:blipFill>
-        <p:spPr bwMode="auto">
-          <a:xfrm>
-            <a:off x="7019317" y="3863502"/>
-            <a:ext cx="2063885" cy="2895600"/>
-          </a:xfrm>
-          <a:prstGeom prst="rect">
-            <a:avLst/>
-          </a:prstGeom>
-          <a:noFill/>
-          <a:ln>
-            <a:noFill/>
-          </a:ln>
-          <a:extLst>
-            <a:ext uri="{909E8E84-426E-40DD-AFC4-6F175D3DCCD1}">
-              <a14:hiddenFill xmlns:a14="http://schemas.microsoft.com/office/drawing/2010/main">
-                <a:solidFill>
-                  <a:schemeClr val="accent1"/>
-                </a:solidFill>
-              </a14:hiddenFill>
-            </a:ext>
-            <a:ext uri="{91240B29-F687-4F45-9708-019B960494DF}">
-              <a14:hiddenLine xmlns:a14="http://schemas.microsoft.com/office/drawing/2010/main" w="9525">
-                <a:solidFill>
-                  <a:schemeClr val="tx1"/>
-                </a:solidFill>
-                <a:miter lim="800000"/>
-                <a:headEnd/>
-                <a:tailEnd/>
-              </a14:hiddenLine>
-            </a:ext>
-          </a:extLst>
-        </p:spPr>
-      </p:pic>
-      <p:sp>
-        <p:nvSpPr>
           <p:cNvPr id="5" name="Title 1"/>
           <p:cNvSpPr txBox="1">
             <a:spLocks/>
@@ -11585,11 +11855,609 @@
           </a:lstStyle>
           <a:p>
             <a:pPr algn="l"/>
+            <a:endParaRPr lang="en-US" dirty="0"/>
+          </a:p>
+        </p:txBody>
+      </p:sp>
+      <p:sp>
+        <p:nvSpPr>
+          <p:cNvPr id="7" name="Title 6"/>
+          <p:cNvSpPr>
+            <a:spLocks noGrp="1"/>
+          </p:cNvSpPr>
+          <p:nvPr>
+            <p:ph type="title"/>
+          </p:nvPr>
+        </p:nvSpPr>
+        <p:spPr/>
+        <p:txBody>
+          <a:bodyPr/>
+          <a:lstStyle/>
+          <a:p>
             <a:r>
               <a:rPr lang="en-US" dirty="0" smtClean="0"/>
-              <a:t>3 Carbon     to    1 Nitrogen          </a:t>
+              <a:t>Ratios</a:t>
             </a:r>
             <a:endParaRPr lang="en-US" dirty="0"/>
+          </a:p>
+        </p:txBody>
+      </p:sp>
+      <p:graphicFrame>
+        <p:nvGraphicFramePr>
+          <p:cNvPr id="9" name="Table 8"/>
+          <p:cNvGraphicFramePr>
+            <a:graphicFrameLocks noGrp="1"/>
+          </p:cNvGraphicFramePr>
+          <p:nvPr>
+            <p:extLst>
+              <p:ext uri="{D42A27DB-BD31-4B8C-83A1-F6EECF244321}">
+                <p14:modId xmlns:p14="http://schemas.microsoft.com/office/powerpoint/2010/main" val="1197192209"/>
+              </p:ext>
+            </p:extLst>
+          </p:nvPr>
+        </p:nvGraphicFramePr>
+        <p:xfrm>
+          <a:off x="1524000" y="2286000"/>
+          <a:ext cx="6096000" cy="3337560"/>
+        </p:xfrm>
+        <a:graphic>
+          <a:graphicData uri="http://schemas.openxmlformats.org/drawingml/2006/table">
+            <a:tbl>
+              <a:tblPr firstRow="1" bandRow="1">
+                <a:tableStyleId>{5C22544A-7EE6-4342-B048-85BDC9FD1C3A}</a:tableStyleId>
+              </a:tblPr>
+              <a:tblGrid>
+                <a:gridCol w="3048000"/>
+                <a:gridCol w="3048000"/>
+              </a:tblGrid>
+              <a:tr h="370840">
+                <a:tc>
+                  <a:txBody>
+                    <a:bodyPr/>
+                    <a:lstStyle/>
+                    <a:p>
+                      <a:pPr algn="ctr"/>
+                      <a:r>
+                        <a:rPr lang="en-US" dirty="0" smtClean="0"/>
+                        <a:t>BROWNS</a:t>
+                      </a:r>
+                      <a:endParaRPr lang="en-US" dirty="0"/>
+                    </a:p>
+                  </a:txBody>
+                  <a:tcPr>
+                    <a:solidFill>
+                      <a:schemeClr val="bg2">
+                        <a:lumMod val="50000"/>
+                      </a:schemeClr>
+                    </a:solidFill>
+                  </a:tcPr>
+                </a:tc>
+                <a:tc>
+                  <a:txBody>
+                    <a:bodyPr/>
+                    <a:lstStyle/>
+                    <a:p>
+                      <a:pPr algn="ctr"/>
+                      <a:r>
+                        <a:rPr lang="en-US" dirty="0" smtClean="0"/>
+                        <a:t>GREENS</a:t>
+                      </a:r>
+                      <a:endParaRPr lang="en-US" dirty="0"/>
+                    </a:p>
+                  </a:txBody>
+                  <a:tcPr>
+                    <a:solidFill>
+                      <a:schemeClr val="accent3"/>
+                    </a:solidFill>
+                  </a:tcPr>
+                </a:tc>
+              </a:tr>
+              <a:tr h="370840">
+                <a:tc>
+                  <a:txBody>
+                    <a:bodyPr/>
+                    <a:lstStyle/>
+                    <a:p>
+                      <a:pPr algn="l" fontAlgn="b"/>
+                      <a:r>
+                        <a:rPr lang="en-US" sz="1800" b="0" i="0" u="none" strike="noStrike" dirty="0">
+                          <a:solidFill>
+                            <a:srgbClr val="000000"/>
+                          </a:solidFill>
+                          <a:effectLst/>
+                          <a:latin typeface="Calibri"/>
+                        </a:rPr>
+                        <a:t>Dried leaves</a:t>
+                      </a:r>
+                    </a:p>
+                  </a:txBody>
+                  <a:tcPr marL="7620" marR="7620" marT="7620" marB="0" anchor="b">
+                    <a:solidFill>
+                      <a:schemeClr val="bg2">
+                        <a:lumMod val="75000"/>
+                      </a:schemeClr>
+                    </a:solidFill>
+                  </a:tcPr>
+                </a:tc>
+                <a:tc>
+                  <a:txBody>
+                    <a:bodyPr/>
+                    <a:lstStyle/>
+                    <a:p>
+                      <a:pPr algn="l" fontAlgn="b"/>
+                      <a:r>
+                        <a:rPr lang="en-US" sz="1800" b="0" i="0" u="none" strike="noStrike" dirty="0">
+                          <a:solidFill>
+                            <a:srgbClr val="000000"/>
+                          </a:solidFill>
+                          <a:effectLst/>
+                          <a:latin typeface="Calibri"/>
+                        </a:rPr>
+                        <a:t>Kitchen scraps</a:t>
+                      </a:r>
+                    </a:p>
+                  </a:txBody>
+                  <a:tcPr marL="7620" marR="7620" marT="7620" marB="0" anchor="b">
+                    <a:solidFill>
+                      <a:schemeClr val="accent3">
+                        <a:lumMod val="40000"/>
+                        <a:lumOff val="60000"/>
+                      </a:schemeClr>
+                    </a:solidFill>
+                  </a:tcPr>
+                </a:tc>
+              </a:tr>
+              <a:tr h="370840">
+                <a:tc>
+                  <a:txBody>
+                    <a:bodyPr/>
+                    <a:lstStyle/>
+                    <a:p>
+                      <a:pPr algn="l" fontAlgn="b"/>
+                      <a:r>
+                        <a:rPr lang="en-US" sz="1800" b="0" i="0" u="none" strike="noStrike" dirty="0">
+                          <a:solidFill>
+                            <a:srgbClr val="000000"/>
+                          </a:solidFill>
+                          <a:effectLst/>
+                          <a:latin typeface="Calibri"/>
+                        </a:rPr>
+                        <a:t>Straw</a:t>
+                      </a:r>
+                    </a:p>
+                  </a:txBody>
+                  <a:tcPr marL="7620" marR="7620" marT="7620" marB="0" anchor="b">
+                    <a:solidFill>
+                      <a:schemeClr val="bg2">
+                        <a:lumMod val="75000"/>
+                      </a:schemeClr>
+                    </a:solidFill>
+                  </a:tcPr>
+                </a:tc>
+                <a:tc>
+                  <a:txBody>
+                    <a:bodyPr/>
+                    <a:lstStyle/>
+                    <a:p>
+                      <a:pPr algn="l" fontAlgn="b"/>
+                      <a:r>
+                        <a:rPr lang="en-US" sz="1800" b="0" i="0" u="none" strike="noStrike" dirty="0">
+                          <a:solidFill>
+                            <a:srgbClr val="000000"/>
+                          </a:solidFill>
+                          <a:effectLst/>
+                          <a:latin typeface="Calibri"/>
+                        </a:rPr>
+                        <a:t>Coffee grounds &amp; filter</a:t>
+                      </a:r>
+                    </a:p>
+                  </a:txBody>
+                  <a:tcPr marL="7620" marR="7620" marT="7620" marB="0" anchor="b">
+                    <a:solidFill>
+                      <a:schemeClr val="accent3">
+                        <a:lumMod val="40000"/>
+                        <a:lumOff val="60000"/>
+                      </a:schemeClr>
+                    </a:solidFill>
+                  </a:tcPr>
+                </a:tc>
+              </a:tr>
+              <a:tr h="370840">
+                <a:tc>
+                  <a:txBody>
+                    <a:bodyPr/>
+                    <a:lstStyle/>
+                    <a:p>
+                      <a:pPr algn="l" fontAlgn="b"/>
+                      <a:r>
+                        <a:rPr lang="en-US" sz="1800" b="0" i="0" u="none" strike="noStrike" dirty="0">
+                          <a:solidFill>
+                            <a:srgbClr val="000000"/>
+                          </a:solidFill>
+                          <a:effectLst/>
+                          <a:latin typeface="Calibri"/>
+                        </a:rPr>
+                        <a:t>Shredded paper</a:t>
+                      </a:r>
+                    </a:p>
+                  </a:txBody>
+                  <a:tcPr marL="7620" marR="7620" marT="7620" marB="0" anchor="b">
+                    <a:solidFill>
+                      <a:schemeClr val="bg2">
+                        <a:lumMod val="75000"/>
+                      </a:schemeClr>
+                    </a:solidFill>
+                  </a:tcPr>
+                </a:tc>
+                <a:tc>
+                  <a:txBody>
+                    <a:bodyPr/>
+                    <a:lstStyle/>
+                    <a:p>
+                      <a:pPr algn="l" fontAlgn="b"/>
+                      <a:r>
+                        <a:rPr lang="en-US" sz="1800" b="0" i="0" u="none" strike="noStrike" dirty="0">
+                          <a:solidFill>
+                            <a:srgbClr val="000000"/>
+                          </a:solidFill>
+                          <a:effectLst/>
+                          <a:latin typeface="Calibri"/>
+                        </a:rPr>
+                        <a:t>Tea bags</a:t>
+                      </a:r>
+                    </a:p>
+                  </a:txBody>
+                  <a:tcPr marL="7620" marR="7620" marT="7620" marB="0" anchor="b">
+                    <a:solidFill>
+                      <a:schemeClr val="accent3">
+                        <a:lumMod val="40000"/>
+                        <a:lumOff val="60000"/>
+                      </a:schemeClr>
+                    </a:solidFill>
+                  </a:tcPr>
+                </a:tc>
+              </a:tr>
+              <a:tr h="370840">
+                <a:tc>
+                  <a:txBody>
+                    <a:bodyPr/>
+                    <a:lstStyle/>
+                    <a:p>
+                      <a:pPr algn="l" fontAlgn="b"/>
+                      <a:r>
+                        <a:rPr lang="en-US" sz="1800" b="0" i="0" u="none" strike="noStrike" dirty="0">
+                          <a:solidFill>
+                            <a:srgbClr val="000000"/>
+                          </a:solidFill>
+                          <a:effectLst/>
+                          <a:latin typeface="Calibri"/>
+                        </a:rPr>
+                        <a:t>Drier lint</a:t>
+                      </a:r>
+                    </a:p>
+                  </a:txBody>
+                  <a:tcPr marL="7620" marR="7620" marT="7620" marB="0" anchor="b">
+                    <a:solidFill>
+                      <a:schemeClr val="bg2">
+                        <a:lumMod val="75000"/>
+                      </a:schemeClr>
+                    </a:solidFill>
+                  </a:tcPr>
+                </a:tc>
+                <a:tc>
+                  <a:txBody>
+                    <a:bodyPr/>
+                    <a:lstStyle/>
+                    <a:p>
+                      <a:pPr algn="l" fontAlgn="b"/>
+                      <a:r>
+                        <a:rPr lang="en-US" sz="1800" b="0" i="0" u="none" strike="noStrike" dirty="0">
+                          <a:solidFill>
+                            <a:srgbClr val="000000"/>
+                          </a:solidFill>
+                          <a:effectLst/>
+                          <a:latin typeface="Calibri"/>
+                        </a:rPr>
+                        <a:t>Yard clippings</a:t>
+                      </a:r>
+                    </a:p>
+                  </a:txBody>
+                  <a:tcPr marL="7620" marR="7620" marT="7620" marB="0" anchor="b">
+                    <a:solidFill>
+                      <a:schemeClr val="accent3">
+                        <a:lumMod val="40000"/>
+                        <a:lumOff val="60000"/>
+                      </a:schemeClr>
+                    </a:solidFill>
+                  </a:tcPr>
+                </a:tc>
+              </a:tr>
+              <a:tr h="370840">
+                <a:tc>
+                  <a:txBody>
+                    <a:bodyPr/>
+                    <a:lstStyle/>
+                    <a:p>
+                      <a:pPr algn="l" fontAlgn="b"/>
+                      <a:r>
+                        <a:rPr lang="en-US" sz="1800" b="0" i="0" u="none" strike="noStrike" dirty="0">
+                          <a:solidFill>
+                            <a:srgbClr val="000000"/>
+                          </a:solidFill>
+                          <a:effectLst/>
+                          <a:latin typeface="Calibri"/>
+                        </a:rPr>
+                        <a:t>Newspaper</a:t>
+                      </a:r>
+                    </a:p>
+                  </a:txBody>
+                  <a:tcPr marL="7620" marR="7620" marT="7620" marB="0" anchor="b">
+                    <a:solidFill>
+                      <a:schemeClr val="bg2">
+                        <a:lumMod val="75000"/>
+                      </a:schemeClr>
+                    </a:solidFill>
+                  </a:tcPr>
+                </a:tc>
+                <a:tc>
+                  <a:txBody>
+                    <a:bodyPr/>
+                    <a:lstStyle/>
+                    <a:p>
+                      <a:pPr algn="l" fontAlgn="b"/>
+                      <a:r>
+                        <a:rPr lang="en-US" sz="1800" b="0" i="0" u="none" strike="noStrike" dirty="0">
+                          <a:solidFill>
+                            <a:srgbClr val="000000"/>
+                          </a:solidFill>
+                          <a:effectLst/>
+                          <a:latin typeface="Calibri"/>
+                        </a:rPr>
+                        <a:t>Pet hair</a:t>
+                      </a:r>
+                    </a:p>
+                  </a:txBody>
+                  <a:tcPr marL="7620" marR="7620" marT="7620" marB="0" anchor="b">
+                    <a:solidFill>
+                      <a:schemeClr val="accent3">
+                        <a:lumMod val="40000"/>
+                        <a:lumOff val="60000"/>
+                      </a:schemeClr>
+                    </a:solidFill>
+                  </a:tcPr>
+                </a:tc>
+              </a:tr>
+              <a:tr h="370840">
+                <a:tc>
+                  <a:txBody>
+                    <a:bodyPr/>
+                    <a:lstStyle/>
+                    <a:p>
+                      <a:pPr algn="l" fontAlgn="b"/>
+                      <a:r>
+                        <a:rPr lang="en-US" sz="1800" b="0" i="0" u="none" strike="noStrike" dirty="0">
+                          <a:solidFill>
+                            <a:srgbClr val="000000"/>
+                          </a:solidFill>
+                          <a:effectLst/>
+                          <a:latin typeface="Calibri"/>
+                        </a:rPr>
+                        <a:t>Pine needles</a:t>
+                      </a:r>
+                    </a:p>
+                  </a:txBody>
+                  <a:tcPr marL="7620" marR="7620" marT="7620" marB="0" anchor="b">
+                    <a:solidFill>
+                      <a:schemeClr val="bg2">
+                        <a:lumMod val="75000"/>
+                      </a:schemeClr>
+                    </a:solidFill>
+                  </a:tcPr>
+                </a:tc>
+                <a:tc>
+                  <a:txBody>
+                    <a:bodyPr/>
+                    <a:lstStyle/>
+                    <a:p>
+                      <a:pPr algn="l" fontAlgn="b"/>
+                      <a:r>
+                        <a:rPr lang="en-US" sz="1800" b="0" i="0" u="none" strike="noStrike" dirty="0">
+                          <a:solidFill>
+                            <a:srgbClr val="000000"/>
+                          </a:solidFill>
+                          <a:effectLst/>
+                          <a:latin typeface="Calibri"/>
+                        </a:rPr>
+                        <a:t>Manure (</a:t>
+                      </a:r>
+                      <a:r>
+                        <a:rPr lang="en-US" sz="1800" b="0" i="0" u="none" strike="noStrike" dirty="0" smtClean="0">
+                          <a:solidFill>
+                            <a:srgbClr val="000000"/>
+                          </a:solidFill>
+                          <a:effectLst/>
+                          <a:latin typeface="Calibri"/>
+                        </a:rPr>
+                        <a:t>from</a:t>
+                      </a:r>
+                      <a:r>
+                        <a:rPr lang="en-US" sz="1800" b="0" i="0" u="none" strike="noStrike" baseline="0" dirty="0" smtClean="0">
+                          <a:solidFill>
+                            <a:srgbClr val="000000"/>
+                          </a:solidFill>
+                          <a:effectLst/>
+                          <a:latin typeface="Calibri"/>
+                        </a:rPr>
+                        <a:t> </a:t>
+                      </a:r>
+                      <a:r>
+                        <a:rPr lang="en-US" sz="1800" b="0" i="0" u="none" strike="noStrike" dirty="0" smtClean="0">
+                          <a:solidFill>
+                            <a:srgbClr val="000000"/>
+                          </a:solidFill>
+                          <a:effectLst/>
+                          <a:latin typeface="Calibri"/>
+                        </a:rPr>
+                        <a:t>herbivores</a:t>
+                      </a:r>
+                      <a:r>
+                        <a:rPr lang="en-US" sz="1800" b="0" i="0" u="none" strike="noStrike" dirty="0">
+                          <a:solidFill>
+                            <a:srgbClr val="000000"/>
+                          </a:solidFill>
+                          <a:effectLst/>
+                          <a:latin typeface="Calibri"/>
+                        </a:rPr>
+                        <a:t>*)</a:t>
+                      </a:r>
+                    </a:p>
+                  </a:txBody>
+                  <a:tcPr marL="7620" marR="7620" marT="7620" marB="0" anchor="b">
+                    <a:solidFill>
+                      <a:schemeClr val="accent3">
+                        <a:lumMod val="40000"/>
+                        <a:lumOff val="60000"/>
+                      </a:schemeClr>
+                    </a:solidFill>
+                  </a:tcPr>
+                </a:tc>
+              </a:tr>
+              <a:tr h="370840">
+                <a:tc>
+                  <a:txBody>
+                    <a:bodyPr/>
+                    <a:lstStyle/>
+                    <a:p>
+                      <a:pPr algn="l" fontAlgn="b"/>
+                      <a:r>
+                        <a:rPr lang="en-US" sz="1800" b="0" i="0" u="none" strike="noStrike" dirty="0">
+                          <a:solidFill>
+                            <a:srgbClr val="000000"/>
+                          </a:solidFill>
+                          <a:effectLst/>
+                          <a:latin typeface="Calibri"/>
+                        </a:rPr>
+                        <a:t>Sawdust</a:t>
+                      </a:r>
+                    </a:p>
+                  </a:txBody>
+                  <a:tcPr marL="7620" marR="7620" marT="7620" marB="0" anchor="b">
+                    <a:solidFill>
+                      <a:schemeClr val="bg2">
+                        <a:lumMod val="75000"/>
+                      </a:schemeClr>
+                    </a:solidFill>
+                  </a:tcPr>
+                </a:tc>
+                <a:tc>
+                  <a:txBody>
+                    <a:bodyPr/>
+                    <a:lstStyle/>
+                    <a:p>
+                      <a:pPr algn="l" fontAlgn="b"/>
+                      <a:endParaRPr lang="en-US" sz="1800" b="0" i="0" u="none" strike="noStrike" dirty="0">
+                        <a:solidFill>
+                          <a:srgbClr val="000000"/>
+                        </a:solidFill>
+                        <a:effectLst/>
+                        <a:latin typeface="Calibri"/>
+                      </a:endParaRPr>
+                    </a:p>
+                  </a:txBody>
+                  <a:tcPr marL="7620" marR="7620" marT="7620" marB="0" anchor="b">
+                    <a:solidFill>
+                      <a:schemeClr val="accent3">
+                        <a:lumMod val="40000"/>
+                        <a:lumOff val="60000"/>
+                      </a:schemeClr>
+                    </a:solidFill>
+                  </a:tcPr>
+                </a:tc>
+              </a:tr>
+              <a:tr h="370840">
+                <a:tc>
+                  <a:txBody>
+                    <a:bodyPr/>
+                    <a:lstStyle/>
+                    <a:p>
+                      <a:pPr algn="l" fontAlgn="b"/>
+                      <a:r>
+                        <a:rPr lang="en-US" sz="1800" b="0" i="0" u="none" strike="noStrike" dirty="0">
+                          <a:solidFill>
+                            <a:srgbClr val="000000"/>
+                          </a:solidFill>
+                          <a:effectLst/>
+                          <a:latin typeface="Calibri"/>
+                        </a:rPr>
+                        <a:t>Paper bags</a:t>
+                      </a:r>
+                    </a:p>
+                  </a:txBody>
+                  <a:tcPr marL="7620" marR="7620" marT="7620" marB="0" anchor="b">
+                    <a:solidFill>
+                      <a:schemeClr val="bg2">
+                        <a:lumMod val="75000"/>
+                      </a:schemeClr>
+                    </a:solidFill>
+                  </a:tcPr>
+                </a:tc>
+                <a:tc>
+                  <a:txBody>
+                    <a:bodyPr/>
+                    <a:lstStyle/>
+                    <a:p>
+                      <a:pPr algn="l" fontAlgn="b"/>
+                      <a:endParaRPr lang="en-US" sz="1800" b="0" i="0" u="none" strike="noStrike" dirty="0">
+                        <a:solidFill>
+                          <a:srgbClr val="000000"/>
+                        </a:solidFill>
+                        <a:effectLst/>
+                        <a:latin typeface="Calibri"/>
+                      </a:endParaRPr>
+                    </a:p>
+                  </a:txBody>
+                  <a:tcPr marL="7620" marR="7620" marT="7620" marB="0" anchor="b">
+                    <a:solidFill>
+                      <a:schemeClr val="accent3">
+                        <a:lumMod val="40000"/>
+                        <a:lumOff val="60000"/>
+                      </a:schemeClr>
+                    </a:solidFill>
+                  </a:tcPr>
+                </a:tc>
+              </a:tr>
+            </a:tbl>
+          </a:graphicData>
+        </a:graphic>
+      </p:graphicFrame>
+      <p:sp>
+        <p:nvSpPr>
+          <p:cNvPr id="10" name="TextBox 9"/>
+          <p:cNvSpPr txBox="1"/>
+          <p:nvPr/>
+        </p:nvSpPr>
+        <p:spPr>
+          <a:xfrm>
+            <a:off x="1524000" y="1752600"/>
+            <a:ext cx="6096000" cy="461665"/>
+          </a:xfrm>
+          <a:prstGeom prst="rect">
+            <a:avLst/>
+          </a:prstGeom>
+          <a:noFill/>
+        </p:spPr>
+        <p:txBody>
+          <a:bodyPr wrap="square" rtlCol="0">
+            <a:spAutoFit/>
+          </a:bodyPr>
+          <a:lstStyle/>
+          <a:p>
+            <a:pPr algn="ctr"/>
+            <a:r>
+              <a:rPr lang="en-US" sz="2400" dirty="0" smtClean="0"/>
+              <a:t>Try to maintain a 3 to 1 Carbon/Nitrogen  Ratio</a:t>
+            </a:r>
+            <a:endParaRPr lang="en-US" sz="2400" dirty="0"/>
           </a:p>
         </p:txBody>
       </p:sp>

</xml_diff>